<commit_message>
updated fig and table captions according to copy editor suggestions
</commit_message>
<xml_diff>
--- a/figs/EMMA_PRISMA_figure_update.pptx
+++ b/figs/EMMA_PRISMA_figure_update.pptx
@@ -63,8 +63,8 @@
         </p:nvSpPr>
         <p:spPr>
           <a:xfrm>
-            <a:off x="1522440" y="1122840"/>
-            <a:ext cx="9142920" cy="2386800"/>
+            <a:off x="1521000" y="1122480"/>
+            <a:ext cx="9142920" cy="2386440"/>
           </a:xfrm>
           <a:prstGeom prst="rect">
             <a:avLst/>
@@ -94,8 +94,8 @@
         </p:nvSpPr>
         <p:spPr>
           <a:xfrm>
-            <a:off x="609480" y="1604520"/>
-            <a:ext cx="10972440" cy="1896840"/>
+            <a:off x="608400" y="1604160"/>
+            <a:ext cx="10971720" cy="1896480"/>
           </a:xfrm>
           <a:prstGeom prst="rect">
             <a:avLst/>
@@ -124,8 +124,8 @@
         </p:nvSpPr>
         <p:spPr>
           <a:xfrm>
-            <a:off x="609480" y="3682080"/>
-            <a:ext cx="10972440" cy="1896840"/>
+            <a:off x="608400" y="3681360"/>
+            <a:ext cx="10971720" cy="1896480"/>
           </a:xfrm>
           <a:prstGeom prst="rect">
             <a:avLst/>
@@ -176,8 +176,8 @@
         </p:nvSpPr>
         <p:spPr>
           <a:xfrm>
-            <a:off x="1522440" y="1122840"/>
-            <a:ext cx="9142920" cy="2386800"/>
+            <a:off x="1521000" y="1122480"/>
+            <a:ext cx="9142920" cy="2386440"/>
           </a:xfrm>
           <a:prstGeom prst="rect">
             <a:avLst/>
@@ -207,8 +207,8 @@
         </p:nvSpPr>
         <p:spPr>
           <a:xfrm>
-            <a:off x="609480" y="1604520"/>
-            <a:ext cx="5354280" cy="1896840"/>
+            <a:off x="608400" y="1604160"/>
+            <a:ext cx="5353920" cy="1896480"/>
           </a:xfrm>
           <a:prstGeom prst="rect">
             <a:avLst/>
@@ -237,8 +237,8 @@
         </p:nvSpPr>
         <p:spPr>
           <a:xfrm>
-            <a:off x="6231960" y="1604520"/>
-            <a:ext cx="5354280" cy="1896840"/>
+            <a:off x="6230520" y="1604160"/>
+            <a:ext cx="5353920" cy="1896480"/>
           </a:xfrm>
           <a:prstGeom prst="rect">
             <a:avLst/>
@@ -267,8 +267,8 @@
         </p:nvSpPr>
         <p:spPr>
           <a:xfrm>
-            <a:off x="609480" y="3682080"/>
-            <a:ext cx="5354280" cy="1896840"/>
+            <a:off x="608400" y="3681360"/>
+            <a:ext cx="5353920" cy="1896480"/>
           </a:xfrm>
           <a:prstGeom prst="rect">
             <a:avLst/>
@@ -297,8 +297,8 @@
         </p:nvSpPr>
         <p:spPr>
           <a:xfrm>
-            <a:off x="6231960" y="3682080"/>
-            <a:ext cx="5354280" cy="1896840"/>
+            <a:off x="6230520" y="3681360"/>
+            <a:ext cx="5353920" cy="1896480"/>
           </a:xfrm>
           <a:prstGeom prst="rect">
             <a:avLst/>
@@ -349,8 +349,8 @@
         </p:nvSpPr>
         <p:spPr>
           <a:xfrm>
-            <a:off x="1522440" y="1122840"/>
-            <a:ext cx="9142920" cy="2386800"/>
+            <a:off x="1521000" y="1122480"/>
+            <a:ext cx="9142920" cy="2386440"/>
           </a:xfrm>
           <a:prstGeom prst="rect">
             <a:avLst/>
@@ -380,8 +380,8 @@
         </p:nvSpPr>
         <p:spPr>
           <a:xfrm>
-            <a:off x="609480" y="1604520"/>
-            <a:ext cx="3533040" cy="1896840"/>
+            <a:off x="608400" y="1604160"/>
+            <a:ext cx="3532680" cy="1896480"/>
           </a:xfrm>
           <a:prstGeom prst="rect">
             <a:avLst/>
@@ -410,8 +410,8 @@
         </p:nvSpPr>
         <p:spPr>
           <a:xfrm>
-            <a:off x="4319640" y="1604520"/>
-            <a:ext cx="3533040" cy="1896840"/>
+            <a:off x="4318200" y="1604160"/>
+            <a:ext cx="3532680" cy="1896480"/>
           </a:xfrm>
           <a:prstGeom prst="rect">
             <a:avLst/>
@@ -440,8 +440,8 @@
         </p:nvSpPr>
         <p:spPr>
           <a:xfrm>
-            <a:off x="8029800" y="1604520"/>
-            <a:ext cx="3533040" cy="1896840"/>
+            <a:off x="8027640" y="1604160"/>
+            <a:ext cx="3532680" cy="1896480"/>
           </a:xfrm>
           <a:prstGeom prst="rect">
             <a:avLst/>
@@ -470,8 +470,8 @@
         </p:nvSpPr>
         <p:spPr>
           <a:xfrm>
-            <a:off x="609480" y="3682080"/>
-            <a:ext cx="3533040" cy="1896840"/>
+            <a:off x="608400" y="3681360"/>
+            <a:ext cx="3532680" cy="1896480"/>
           </a:xfrm>
           <a:prstGeom prst="rect">
             <a:avLst/>
@@ -500,8 +500,8 @@
         </p:nvSpPr>
         <p:spPr>
           <a:xfrm>
-            <a:off x="4319640" y="3682080"/>
-            <a:ext cx="3533040" cy="1896840"/>
+            <a:off x="4318200" y="3681360"/>
+            <a:ext cx="3532680" cy="1896480"/>
           </a:xfrm>
           <a:prstGeom prst="rect">
             <a:avLst/>
@@ -530,8 +530,8 @@
         </p:nvSpPr>
         <p:spPr>
           <a:xfrm>
-            <a:off x="8029800" y="3682080"/>
-            <a:ext cx="3533040" cy="1896840"/>
+            <a:off x="8027640" y="3681360"/>
+            <a:ext cx="3532680" cy="1896480"/>
           </a:xfrm>
           <a:prstGeom prst="rect">
             <a:avLst/>
@@ -582,8 +582,8 @@
         </p:nvSpPr>
         <p:spPr>
           <a:xfrm>
-            <a:off x="1522440" y="1122840"/>
-            <a:ext cx="9142920" cy="2386800"/>
+            <a:off x="1521000" y="1122480"/>
+            <a:ext cx="9142920" cy="2386440"/>
           </a:xfrm>
           <a:prstGeom prst="rect">
             <a:avLst/>
@@ -613,8 +613,8 @@
         </p:nvSpPr>
         <p:spPr>
           <a:xfrm>
-            <a:off x="609480" y="1604520"/>
-            <a:ext cx="10972440" cy="3977280"/>
+            <a:off x="608400" y="1604160"/>
+            <a:ext cx="10971720" cy="3976560"/>
           </a:xfrm>
           <a:prstGeom prst="rect">
             <a:avLst/>
@@ -666,8 +666,8 @@
         </p:nvSpPr>
         <p:spPr>
           <a:xfrm>
-            <a:off x="1522440" y="1122840"/>
-            <a:ext cx="9142920" cy="2386800"/>
+            <a:off x="1521000" y="1122480"/>
+            <a:ext cx="9142920" cy="2386440"/>
           </a:xfrm>
           <a:prstGeom prst="rect">
             <a:avLst/>
@@ -697,8 +697,8 @@
         </p:nvSpPr>
         <p:spPr>
           <a:xfrm>
-            <a:off x="609480" y="1604520"/>
-            <a:ext cx="10972440" cy="3977280"/>
+            <a:off x="608400" y="1604160"/>
+            <a:ext cx="10971720" cy="3976560"/>
           </a:xfrm>
           <a:prstGeom prst="rect">
             <a:avLst/>
@@ -749,8 +749,8 @@
         </p:nvSpPr>
         <p:spPr>
           <a:xfrm>
-            <a:off x="1522440" y="1122840"/>
-            <a:ext cx="9142920" cy="2386800"/>
+            <a:off x="1521000" y="1122480"/>
+            <a:ext cx="9142920" cy="2386440"/>
           </a:xfrm>
           <a:prstGeom prst="rect">
             <a:avLst/>
@@ -780,8 +780,8 @@
         </p:nvSpPr>
         <p:spPr>
           <a:xfrm>
-            <a:off x="609480" y="1604520"/>
-            <a:ext cx="5354280" cy="3977280"/>
+            <a:off x="608400" y="1604160"/>
+            <a:ext cx="5353920" cy="3976560"/>
           </a:xfrm>
           <a:prstGeom prst="rect">
             <a:avLst/>
@@ -810,8 +810,8 @@
         </p:nvSpPr>
         <p:spPr>
           <a:xfrm>
-            <a:off x="6231960" y="1604520"/>
-            <a:ext cx="5354280" cy="3977280"/>
+            <a:off x="6230520" y="1604160"/>
+            <a:ext cx="5353920" cy="3976560"/>
           </a:xfrm>
           <a:prstGeom prst="rect">
             <a:avLst/>
@@ -862,8 +862,8 @@
         </p:nvSpPr>
         <p:spPr>
           <a:xfrm>
-            <a:off x="1522440" y="1122840"/>
-            <a:ext cx="9142920" cy="2386800"/>
+            <a:off x="1521000" y="1122480"/>
+            <a:ext cx="9142920" cy="2386440"/>
           </a:xfrm>
           <a:prstGeom prst="rect">
             <a:avLst/>
@@ -915,8 +915,8 @@
         </p:nvSpPr>
         <p:spPr>
           <a:xfrm>
-            <a:off x="1522440" y="1122840"/>
-            <a:ext cx="9142920" cy="11064960"/>
+            <a:off x="1521000" y="1236240"/>
+            <a:ext cx="9142920" cy="10836000"/>
           </a:xfrm>
           <a:prstGeom prst="rect">
             <a:avLst/>
@@ -968,8 +968,8 @@
         </p:nvSpPr>
         <p:spPr>
           <a:xfrm>
-            <a:off x="1522440" y="1122840"/>
-            <a:ext cx="9142920" cy="2386800"/>
+            <a:off x="1521000" y="1122480"/>
+            <a:ext cx="9142920" cy="2386440"/>
           </a:xfrm>
           <a:prstGeom prst="rect">
             <a:avLst/>
@@ -999,8 +999,8 @@
         </p:nvSpPr>
         <p:spPr>
           <a:xfrm>
-            <a:off x="609480" y="1604520"/>
-            <a:ext cx="5354280" cy="1896840"/>
+            <a:off x="608400" y="1604160"/>
+            <a:ext cx="5353920" cy="1896480"/>
           </a:xfrm>
           <a:prstGeom prst="rect">
             <a:avLst/>
@@ -1029,8 +1029,8 @@
         </p:nvSpPr>
         <p:spPr>
           <a:xfrm>
-            <a:off x="6231960" y="1604520"/>
-            <a:ext cx="5354280" cy="3977280"/>
+            <a:off x="6230520" y="1604160"/>
+            <a:ext cx="5353920" cy="3976560"/>
           </a:xfrm>
           <a:prstGeom prst="rect">
             <a:avLst/>
@@ -1059,8 +1059,8 @@
         </p:nvSpPr>
         <p:spPr>
           <a:xfrm>
-            <a:off x="609480" y="3682080"/>
-            <a:ext cx="5354280" cy="1896840"/>
+            <a:off x="608400" y="3681360"/>
+            <a:ext cx="5353920" cy="1896480"/>
           </a:xfrm>
           <a:prstGeom prst="rect">
             <a:avLst/>
@@ -1111,8 +1111,8 @@
         </p:nvSpPr>
         <p:spPr>
           <a:xfrm>
-            <a:off x="1522440" y="1122840"/>
-            <a:ext cx="9142920" cy="2386800"/>
+            <a:off x="1521000" y="1122480"/>
+            <a:ext cx="9142920" cy="2386440"/>
           </a:xfrm>
           <a:prstGeom prst="rect">
             <a:avLst/>
@@ -1142,8 +1142,8 @@
         </p:nvSpPr>
         <p:spPr>
           <a:xfrm>
-            <a:off x="609480" y="1604520"/>
-            <a:ext cx="5354280" cy="3977280"/>
+            <a:off x="608400" y="1604160"/>
+            <a:ext cx="5353920" cy="3976560"/>
           </a:xfrm>
           <a:prstGeom prst="rect">
             <a:avLst/>
@@ -1172,8 +1172,8 @@
         </p:nvSpPr>
         <p:spPr>
           <a:xfrm>
-            <a:off x="6231960" y="1604520"/>
-            <a:ext cx="5354280" cy="1896840"/>
+            <a:off x="6230520" y="1604160"/>
+            <a:ext cx="5353920" cy="1896480"/>
           </a:xfrm>
           <a:prstGeom prst="rect">
             <a:avLst/>
@@ -1202,8 +1202,8 @@
         </p:nvSpPr>
         <p:spPr>
           <a:xfrm>
-            <a:off x="6231960" y="3682080"/>
-            <a:ext cx="5354280" cy="1896840"/>
+            <a:off x="6230520" y="3681360"/>
+            <a:ext cx="5353920" cy="1896480"/>
           </a:xfrm>
           <a:prstGeom prst="rect">
             <a:avLst/>
@@ -1254,8 +1254,8 @@
         </p:nvSpPr>
         <p:spPr>
           <a:xfrm>
-            <a:off x="1522440" y="1122840"/>
-            <a:ext cx="9142920" cy="2386800"/>
+            <a:off x="1521000" y="1122480"/>
+            <a:ext cx="9142920" cy="2386440"/>
           </a:xfrm>
           <a:prstGeom prst="rect">
             <a:avLst/>
@@ -1285,8 +1285,8 @@
         </p:nvSpPr>
         <p:spPr>
           <a:xfrm>
-            <a:off x="609480" y="1604520"/>
-            <a:ext cx="5354280" cy="1896840"/>
+            <a:off x="608400" y="1604160"/>
+            <a:ext cx="5353920" cy="1896480"/>
           </a:xfrm>
           <a:prstGeom prst="rect">
             <a:avLst/>
@@ -1315,8 +1315,8 @@
         </p:nvSpPr>
         <p:spPr>
           <a:xfrm>
-            <a:off x="6231960" y="1604520"/>
-            <a:ext cx="5354280" cy="1896840"/>
+            <a:off x="6230520" y="1604160"/>
+            <a:ext cx="5353920" cy="1896480"/>
           </a:xfrm>
           <a:prstGeom prst="rect">
             <a:avLst/>
@@ -1345,8 +1345,8 @@
         </p:nvSpPr>
         <p:spPr>
           <a:xfrm>
-            <a:off x="609480" y="3682080"/>
-            <a:ext cx="10972440" cy="1896840"/>
+            <a:off x="608400" y="3681360"/>
+            <a:ext cx="10971720" cy="1896480"/>
           </a:xfrm>
           <a:prstGeom prst="rect">
             <a:avLst/>
@@ -1404,8 +1404,8 @@
         </p:nvSpPr>
         <p:spPr>
           <a:xfrm>
-            <a:off x="1522440" y="1122840"/>
-            <a:ext cx="9142920" cy="2386800"/>
+            <a:off x="1521000" y="1122480"/>
+            <a:ext cx="9142920" cy="2386440"/>
           </a:xfrm>
           <a:prstGeom prst="rect">
             <a:avLst/>
@@ -1416,7 +1416,6 @@
             <a:noAutofit/>
           </a:bodyPr>
           <a:p>
-            <a:pPr algn="ctr"/>
             <a:r>
               <a:rPr b="0" lang="en-GB" sz="1800" spc="-1" strike="noStrike">
                 <a:latin typeface="Arial"/>
@@ -1441,8 +1440,8 @@
         </p:nvSpPr>
         <p:spPr>
           <a:xfrm>
-            <a:off x="609480" y="1604520"/>
-            <a:ext cx="10972440" cy="3977280"/>
+            <a:off x="608400" y="1604160"/>
+            <a:ext cx="10971720" cy="3976560"/>
           </a:xfrm>
           <a:prstGeom prst="rect">
             <a:avLst/>
@@ -1455,7 +1454,7 @@
           <a:p>
             <a:pPr marL="432000" indent="-324000">
               <a:spcBef>
-                <a:spcPts val="1417"/>
+                <a:spcPts val="1412"/>
               </a:spcBef>
               <a:buClr>
                 <a:srgbClr val="000000"/>
@@ -1465,19 +1464,19 @@
               <a:buChar char=""/>
             </a:pPr>
             <a:r>
-              <a:rPr b="0" lang="en-GB" sz="3200" spc="-1" strike="noStrike">
+              <a:rPr b="0" lang="en-GB" sz="1800" spc="-1" strike="noStrike">
                 <a:latin typeface="Arial"/>
               </a:rPr>
               <a:t>Click to edit the outline text format</a:t>
             </a:r>
-            <a:endParaRPr b="0" lang="en-GB" sz="3200" spc="-1" strike="noStrike">
+            <a:endParaRPr b="0" lang="en-GB" sz="1800" spc="-1" strike="noStrike">
               <a:latin typeface="Arial"/>
             </a:endParaRPr>
           </a:p>
           <a:p>
             <a:pPr lvl="1" marL="864000" indent="-324000">
               <a:spcBef>
-                <a:spcPts val="1134"/>
+                <a:spcPts val="1128"/>
               </a:spcBef>
               <a:buClr>
                 <a:srgbClr val="000000"/>
@@ -1487,19 +1486,19 @@
               <a:buChar char=""/>
             </a:pPr>
             <a:r>
-              <a:rPr b="0" lang="en-GB" sz="2800" spc="-1" strike="noStrike">
+              <a:rPr b="0" lang="en-GB" sz="1800" spc="-1" strike="noStrike">
                 <a:latin typeface="Arial"/>
               </a:rPr>
               <a:t>Second Outline Level</a:t>
             </a:r>
-            <a:endParaRPr b="0" lang="en-GB" sz="2800" spc="-1" strike="noStrike">
+            <a:endParaRPr b="0" lang="en-GB" sz="1800" spc="-1" strike="noStrike">
               <a:latin typeface="Arial"/>
             </a:endParaRPr>
           </a:p>
           <a:p>
             <a:pPr lvl="2" marL="1296000" indent="-288000">
               <a:spcBef>
-                <a:spcPts val="850"/>
+                <a:spcPts val="845"/>
               </a:spcBef>
               <a:buClr>
                 <a:srgbClr val="000000"/>
@@ -1509,19 +1508,19 @@
               <a:buChar char=""/>
             </a:pPr>
             <a:r>
-              <a:rPr b="0" lang="en-GB" sz="2400" spc="-1" strike="noStrike">
+              <a:rPr b="0" lang="en-GB" sz="1800" spc="-1" strike="noStrike">
                 <a:latin typeface="Arial"/>
               </a:rPr>
               <a:t>Third Outline Level</a:t>
             </a:r>
-            <a:endParaRPr b="0" lang="en-GB" sz="2400" spc="-1" strike="noStrike">
+            <a:endParaRPr b="0" lang="en-GB" sz="1800" spc="-1" strike="noStrike">
               <a:latin typeface="Arial"/>
             </a:endParaRPr>
           </a:p>
           <a:p>
             <a:pPr lvl="3" marL="1728000" indent="-216000">
               <a:spcBef>
-                <a:spcPts val="567"/>
+                <a:spcPts val="561"/>
               </a:spcBef>
               <a:buClr>
                 <a:srgbClr val="000000"/>
@@ -1531,19 +1530,19 @@
               <a:buChar char=""/>
             </a:pPr>
             <a:r>
-              <a:rPr b="0" lang="en-GB" sz="2000" spc="-1" strike="noStrike">
+              <a:rPr b="0" lang="en-GB" sz="1800" spc="-1" strike="noStrike">
                 <a:latin typeface="Arial"/>
               </a:rPr>
               <a:t>Fourth Outline Level</a:t>
             </a:r>
-            <a:endParaRPr b="0" lang="en-GB" sz="2000" spc="-1" strike="noStrike">
+            <a:endParaRPr b="0" lang="en-GB" sz="1800" spc="-1" strike="noStrike">
               <a:latin typeface="Arial"/>
             </a:endParaRPr>
           </a:p>
           <a:p>
             <a:pPr lvl="4" marL="2160000" indent="-216000">
               <a:spcBef>
-                <a:spcPts val="283"/>
+                <a:spcPts val="278"/>
               </a:spcBef>
               <a:buClr>
                 <a:srgbClr val="000000"/>
@@ -1553,19 +1552,19 @@
               <a:buChar char=""/>
             </a:pPr>
             <a:r>
-              <a:rPr b="0" lang="en-GB" sz="2000" spc="-1" strike="noStrike">
+              <a:rPr b="0" lang="en-GB" sz="1800" spc="-1" strike="noStrike">
                 <a:latin typeface="Arial"/>
               </a:rPr>
               <a:t>Fifth Outline Level</a:t>
             </a:r>
-            <a:endParaRPr b="0" lang="en-GB" sz="2000" spc="-1" strike="noStrike">
+            <a:endParaRPr b="0" lang="en-GB" sz="1800" spc="-1" strike="noStrike">
               <a:latin typeface="Arial"/>
             </a:endParaRPr>
           </a:p>
           <a:p>
             <a:pPr lvl="5" marL="2592000" indent="-216000">
               <a:spcBef>
-                <a:spcPts val="283"/>
+                <a:spcPts val="278"/>
               </a:spcBef>
               <a:buClr>
                 <a:srgbClr val="000000"/>
@@ -1575,19 +1574,19 @@
               <a:buChar char=""/>
             </a:pPr>
             <a:r>
-              <a:rPr b="0" lang="en-GB" sz="2000" spc="-1" strike="noStrike">
+              <a:rPr b="0" lang="en-GB" sz="1800" spc="-1" strike="noStrike">
                 <a:latin typeface="Arial"/>
               </a:rPr>
               <a:t>Sixth Outline Level</a:t>
             </a:r>
-            <a:endParaRPr b="0" lang="en-GB" sz="2000" spc="-1" strike="noStrike">
+            <a:endParaRPr b="0" lang="en-GB" sz="1800" spc="-1" strike="noStrike">
               <a:latin typeface="Arial"/>
             </a:endParaRPr>
           </a:p>
           <a:p>
             <a:pPr lvl="6" marL="3024000" indent="-216000">
               <a:spcBef>
-                <a:spcPts val="283"/>
+                <a:spcPts val="278"/>
               </a:spcBef>
               <a:buClr>
                 <a:srgbClr val="000000"/>
@@ -1597,12 +1596,12 @@
               <a:buChar char=""/>
             </a:pPr>
             <a:r>
-              <a:rPr b="0" lang="en-GB" sz="2000" spc="-1" strike="noStrike">
+              <a:rPr b="0" lang="en-GB" sz="1800" spc="-1" strike="noStrike">
                 <a:latin typeface="Arial"/>
               </a:rPr>
               <a:t>Seventh Outline Level</a:t>
             </a:r>
-            <a:endParaRPr b="0" lang="en-GB" sz="2000" spc="-1" strike="noStrike">
+            <a:endParaRPr b="0" lang="en-GB" sz="1800" spc="-1" strike="noStrike">
               <a:latin typeface="Arial"/>
             </a:endParaRPr>
           </a:p>
@@ -1647,580 +1646,14 @@
       </p:grpSpPr>
       <p:sp>
         <p:nvSpPr>
-          <p:cNvPr id="38" name="CustomShape 1"/>
+          <p:cNvPr id="38" name="CustomShape 7"/>
           <p:cNvSpPr/>
           <p:nvPr/>
         </p:nvSpPr>
         <p:spPr>
           <a:xfrm>
-            <a:off x="3069360" y="686520"/>
-            <a:ext cx="2491560" cy="587160"/>
-          </a:xfrm>
-          <a:prstGeom prst="rect">
-            <a:avLst/>
-          </a:prstGeom>
-          <a:solidFill>
-            <a:srgbClr val="ffffff"/>
-          </a:solidFill>
-          <a:ln w="9525">
-            <a:solidFill>
-              <a:srgbClr val="000000"/>
-            </a:solidFill>
-            <a:miter/>
-          </a:ln>
-        </p:spPr>
-        <p:style>
-          <a:lnRef idx="0"/>
-          <a:fillRef idx="0"/>
-          <a:effectRef idx="0"/>
-          <a:fontRef idx="minor"/>
-        </p:style>
-        <p:txBody>
-          <a:bodyPr lIns="90000" rIns="90000" tIns="45000" bIns="45000">
-            <a:noAutofit/>
-          </a:bodyPr>
-          <a:p>
-            <a:pPr algn="ctr">
-              <a:lnSpc>
-                <a:spcPct val="100000"/>
-              </a:lnSpc>
-              <a:spcAft>
-                <a:spcPts val="799"/>
-              </a:spcAft>
-            </a:pPr>
-            <a:r>
-              <a:rPr b="0" lang="en-US" sz="1000" spc="-1" strike="noStrike">
-                <a:solidFill>
-                  <a:srgbClr val="000000"/>
-                </a:solidFill>
-                <a:latin typeface="Arial"/>
-                <a:ea typeface="Calibri"/>
-              </a:rPr>
-              <a:t>Records identified through database search and screened by abstract             (</a:t>
-            </a:r>
-            <a:r>
-              <a:rPr b="0" i="1" lang="en-US" sz="1000" spc="-1" strike="noStrike">
-                <a:solidFill>
-                  <a:srgbClr val="000000"/>
-                </a:solidFill>
-                <a:latin typeface="Arial"/>
-                <a:ea typeface="Calibri"/>
-              </a:rPr>
-              <a:t>k </a:t>
-            </a:r>
-            <a:r>
-              <a:rPr b="0" lang="en-US" sz="1000" spc="-1" strike="noStrike">
-                <a:solidFill>
-                  <a:srgbClr val="000000"/>
-                </a:solidFill>
-                <a:latin typeface="Arial"/>
-                <a:ea typeface="Calibri"/>
-              </a:rPr>
-              <a:t>=2956)</a:t>
-            </a:r>
-            <a:endParaRPr b="0" lang="en-GB" sz="1000" spc="-1" strike="noStrike">
-              <a:latin typeface="Arial"/>
-            </a:endParaRPr>
-          </a:p>
-          <a:p>
-            <a:pPr algn="ctr">
-              <a:lnSpc>
-                <a:spcPct val="107000"/>
-              </a:lnSpc>
-              <a:spcAft>
-                <a:spcPts val="799"/>
-              </a:spcAft>
-            </a:pPr>
-            <a:r>
-              <a:rPr b="0" lang="en-US" sz="1000" spc="-1" strike="noStrike">
-                <a:solidFill>
-                  <a:srgbClr val="000000"/>
-                </a:solidFill>
-                <a:latin typeface="Arial"/>
-                <a:ea typeface="Calibri"/>
-              </a:rPr>
-              <a:t> </a:t>
-            </a:r>
-            <a:endParaRPr b="0" lang="en-GB" sz="1000" spc="-1" strike="noStrike">
-              <a:latin typeface="Arial"/>
-            </a:endParaRPr>
-          </a:p>
-        </p:txBody>
-      </p:sp>
-      <p:sp>
-        <p:nvSpPr>
-          <p:cNvPr id="39" name="CustomShape 2"/>
-          <p:cNvSpPr/>
-          <p:nvPr/>
-        </p:nvSpPr>
-        <p:spPr>
-          <a:xfrm>
-            <a:off x="3070800" y="1499400"/>
-            <a:ext cx="2491560" cy="433080"/>
-          </a:xfrm>
-          <a:prstGeom prst="rect">
-            <a:avLst/>
-          </a:prstGeom>
-          <a:solidFill>
-            <a:srgbClr val="ffffff"/>
-          </a:solidFill>
-          <a:ln w="9525">
-            <a:solidFill>
-              <a:srgbClr val="000000"/>
-            </a:solidFill>
-            <a:miter/>
-          </a:ln>
-        </p:spPr>
-        <p:style>
-          <a:lnRef idx="0"/>
-          <a:fillRef idx="0"/>
-          <a:effectRef idx="0"/>
-          <a:fontRef idx="minor"/>
-        </p:style>
-        <p:txBody>
-          <a:bodyPr lIns="90000" rIns="90000" tIns="45000" bIns="45000">
-            <a:noAutofit/>
-          </a:bodyPr>
-          <a:p>
-            <a:pPr algn="ctr">
-              <a:lnSpc>
-                <a:spcPct val="100000"/>
-              </a:lnSpc>
-              <a:spcAft>
-                <a:spcPts val="799"/>
-              </a:spcAft>
-            </a:pPr>
-            <a:r>
-              <a:rPr b="0" lang="en-US" sz="1000" spc="-1" strike="noStrike">
-                <a:solidFill>
-                  <a:srgbClr val="000000"/>
-                </a:solidFill>
-                <a:latin typeface="Arial"/>
-                <a:ea typeface="Calibri"/>
-              </a:rPr>
-              <a:t>Records selected for more detailed evaluation (</a:t>
-            </a:r>
-            <a:r>
-              <a:rPr b="0" i="1" lang="en-US" sz="1000" spc="-1" strike="noStrike">
-                <a:solidFill>
-                  <a:srgbClr val="000000"/>
-                </a:solidFill>
-                <a:latin typeface="Arial"/>
-                <a:ea typeface="Calibri"/>
-              </a:rPr>
-              <a:t>k </a:t>
-            </a:r>
-            <a:r>
-              <a:rPr b="0" lang="en-US" sz="1000" spc="-1" strike="noStrike">
-                <a:solidFill>
-                  <a:srgbClr val="000000"/>
-                </a:solidFill>
-                <a:latin typeface="Arial"/>
-                <a:ea typeface="Calibri"/>
-              </a:rPr>
-              <a:t>= 591)</a:t>
-            </a:r>
-            <a:endParaRPr b="0" lang="en-GB" sz="1000" spc="-1" strike="noStrike">
-              <a:latin typeface="Arial"/>
-            </a:endParaRPr>
-          </a:p>
-        </p:txBody>
-      </p:sp>
-      <p:sp>
-        <p:nvSpPr>
-          <p:cNvPr id="40" name="CustomShape 3"/>
-          <p:cNvSpPr/>
-          <p:nvPr/>
-        </p:nvSpPr>
-        <p:spPr>
-          <a:xfrm>
-            <a:off x="6222240" y="686520"/>
-            <a:ext cx="2896920" cy="507600"/>
-          </a:xfrm>
-          <a:prstGeom prst="rect">
-            <a:avLst/>
-          </a:prstGeom>
-          <a:solidFill>
-            <a:srgbClr val="ffffff"/>
-          </a:solidFill>
-          <a:ln w="9525">
-            <a:solidFill>
-              <a:srgbClr val="000000"/>
-            </a:solidFill>
-            <a:miter/>
-          </a:ln>
-        </p:spPr>
-        <p:style>
-          <a:lnRef idx="0"/>
-          <a:fillRef idx="0"/>
-          <a:effectRef idx="0"/>
-          <a:fontRef idx="minor"/>
-        </p:style>
-        <p:txBody>
-          <a:bodyPr lIns="90000" rIns="90000" tIns="45000" bIns="45000">
-            <a:noAutofit/>
-          </a:bodyPr>
-          <a:p>
-            <a:pPr>
-              <a:lnSpc>
-                <a:spcPct val="100000"/>
-              </a:lnSpc>
-              <a:spcAft>
-                <a:spcPts val="799"/>
-              </a:spcAft>
-            </a:pPr>
-            <a:r>
-              <a:rPr b="0" lang="en-US" sz="1000" spc="-1" strike="noStrike">
-                <a:solidFill>
-                  <a:srgbClr val="000000"/>
-                </a:solidFill>
-                <a:latin typeface="Arial"/>
-                <a:ea typeface="Calibri"/>
-              </a:rPr>
-              <a:t>Records excluded:</a:t>
-            </a:r>
-            <a:endParaRPr b="0" lang="en-GB" sz="1000" spc="-1" strike="noStrike">
-              <a:latin typeface="Arial"/>
-            </a:endParaRPr>
-          </a:p>
-          <a:p>
-            <a:pPr>
-              <a:lnSpc>
-                <a:spcPct val="100000"/>
-              </a:lnSpc>
-              <a:spcAft>
-                <a:spcPts val="799"/>
-              </a:spcAft>
-            </a:pPr>
-            <a:r>
-              <a:rPr b="0" lang="en-US" sz="1000" spc="-1" strike="noStrike">
-                <a:solidFill>
-                  <a:srgbClr val="000000"/>
-                </a:solidFill>
-                <a:latin typeface="Arial"/>
-                <a:ea typeface="Calibri"/>
-              </a:rPr>
-              <a:t>Title and abstract not relevant (</a:t>
-            </a:r>
-            <a:r>
-              <a:rPr b="0" i="1" lang="en-US" sz="1000" spc="-1" strike="noStrike">
-                <a:solidFill>
-                  <a:srgbClr val="000000"/>
-                </a:solidFill>
-                <a:latin typeface="Arial"/>
-                <a:ea typeface="Calibri"/>
-              </a:rPr>
-              <a:t>k = </a:t>
-            </a:r>
-            <a:r>
-              <a:rPr b="0" lang="en-US" sz="1000" spc="-1" strike="noStrike">
-                <a:solidFill>
-                  <a:srgbClr val="000000"/>
-                </a:solidFill>
-                <a:latin typeface="Arial"/>
-                <a:ea typeface="Calibri"/>
-              </a:rPr>
-              <a:t>2365) </a:t>
-            </a:r>
-            <a:endParaRPr b="0" lang="en-GB" sz="1000" spc="-1" strike="noStrike">
-              <a:latin typeface="Arial"/>
-            </a:endParaRPr>
-          </a:p>
-        </p:txBody>
-      </p:sp>
-      <p:sp>
-        <p:nvSpPr>
-          <p:cNvPr id="41" name="CustomShape 4"/>
-          <p:cNvSpPr/>
-          <p:nvPr/>
-        </p:nvSpPr>
-        <p:spPr>
-          <a:xfrm>
-            <a:off x="3069360" y="2478600"/>
-            <a:ext cx="2491560" cy="433080"/>
-          </a:xfrm>
-          <a:prstGeom prst="rect">
-            <a:avLst/>
-          </a:prstGeom>
-          <a:solidFill>
-            <a:srgbClr val="ffffff"/>
-          </a:solidFill>
-          <a:ln w="9525">
-            <a:solidFill>
-              <a:srgbClr val="000000"/>
-            </a:solidFill>
-            <a:miter/>
-          </a:ln>
-        </p:spPr>
-        <p:style>
-          <a:lnRef idx="0"/>
-          <a:fillRef idx="0"/>
-          <a:effectRef idx="0"/>
-          <a:fontRef idx="minor"/>
-        </p:style>
-        <p:txBody>
-          <a:bodyPr lIns="90000" rIns="90000" tIns="45000" bIns="45000">
-            <a:noAutofit/>
-          </a:bodyPr>
-          <a:p>
-            <a:pPr algn="ctr">
-              <a:lnSpc>
-                <a:spcPct val="100000"/>
-              </a:lnSpc>
-              <a:spcAft>
-                <a:spcPts val="799"/>
-              </a:spcAft>
-            </a:pPr>
-            <a:r>
-              <a:rPr b="0" lang="en-US" sz="1000" spc="-1" strike="noStrike">
-                <a:solidFill>
-                  <a:srgbClr val="000000"/>
-                </a:solidFill>
-                <a:latin typeface="Arial"/>
-                <a:ea typeface="Calibri"/>
-              </a:rPr>
-              <a:t>Full-text articles assessed for eligibility  (</a:t>
-            </a:r>
-            <a:r>
-              <a:rPr b="0" i="1" lang="en-US" sz="1000" spc="-1" strike="noStrike">
-                <a:solidFill>
-                  <a:srgbClr val="000000"/>
-                </a:solidFill>
-                <a:latin typeface="Arial"/>
-                <a:ea typeface="Calibri"/>
-              </a:rPr>
-              <a:t>k</a:t>
-            </a:r>
-            <a:r>
-              <a:rPr b="0" lang="en-US" sz="1000" spc="-1" strike="noStrike">
-                <a:solidFill>
-                  <a:srgbClr val="000000"/>
-                </a:solidFill>
-                <a:latin typeface="Arial"/>
-                <a:ea typeface="Calibri"/>
-              </a:rPr>
-              <a:t> = 412)</a:t>
-            </a:r>
-            <a:endParaRPr b="0" lang="en-GB" sz="1000" spc="-1" strike="noStrike">
-              <a:latin typeface="Arial"/>
-            </a:endParaRPr>
-          </a:p>
-        </p:txBody>
-      </p:sp>
-      <p:sp>
-        <p:nvSpPr>
-          <p:cNvPr id="42" name="CustomShape 5"/>
-          <p:cNvSpPr/>
-          <p:nvPr/>
-        </p:nvSpPr>
-        <p:spPr>
-          <a:xfrm>
-            <a:off x="6221520" y="1503360"/>
-            <a:ext cx="2894760" cy="670680"/>
-          </a:xfrm>
-          <a:prstGeom prst="rect">
-            <a:avLst/>
-          </a:prstGeom>
-          <a:solidFill>
-            <a:srgbClr val="ffffff"/>
-          </a:solidFill>
-          <a:ln w="9525">
-            <a:solidFill>
-              <a:srgbClr val="000000"/>
-            </a:solidFill>
-            <a:miter/>
-          </a:ln>
-        </p:spPr>
-        <p:style>
-          <a:lnRef idx="0"/>
-          <a:fillRef idx="0"/>
-          <a:effectRef idx="0"/>
-          <a:fontRef idx="minor"/>
-        </p:style>
-        <p:txBody>
-          <a:bodyPr lIns="90000" rIns="90000" tIns="45000" bIns="45000">
-            <a:noAutofit/>
-          </a:bodyPr>
-          <a:p>
-            <a:pPr>
-              <a:lnSpc>
-                <a:spcPct val="100000"/>
-              </a:lnSpc>
-              <a:spcAft>
-                <a:spcPts val="799"/>
-              </a:spcAft>
-            </a:pPr>
-            <a:r>
-              <a:rPr b="0" lang="en-US" sz="1000" spc="-1" strike="noStrike">
-                <a:solidFill>
-                  <a:srgbClr val="000000"/>
-                </a:solidFill>
-                <a:latin typeface="Arial"/>
-                <a:ea typeface="Calibri"/>
-              </a:rPr>
-              <a:t>Records excluded: </a:t>
-            </a:r>
-            <a:endParaRPr b="0" lang="en-GB" sz="1000" spc="-1" strike="noStrike">
-              <a:latin typeface="Arial"/>
-            </a:endParaRPr>
-          </a:p>
-          <a:p>
-            <a:pPr>
-              <a:lnSpc>
-                <a:spcPct val="100000"/>
-              </a:lnSpc>
-              <a:spcAft>
-                <a:spcPts val="799"/>
-              </a:spcAft>
-            </a:pPr>
-            <a:r>
-              <a:rPr b="0" lang="en-US" sz="1000" spc="-1" strike="noStrike">
-                <a:solidFill>
-                  <a:srgbClr val="000000"/>
-                </a:solidFill>
-                <a:latin typeface="Arial"/>
-                <a:ea typeface="Calibri"/>
-              </a:rPr>
-              <a:t>Not studies on decision-making or no eye tracking (</a:t>
-            </a:r>
-            <a:r>
-              <a:rPr b="0" i="1" lang="en-US" sz="1000" spc="-1" strike="noStrike">
-                <a:solidFill>
-                  <a:srgbClr val="000000"/>
-                </a:solidFill>
-                <a:latin typeface="Arial"/>
-                <a:ea typeface="Calibri"/>
-              </a:rPr>
-              <a:t>k</a:t>
-            </a:r>
-            <a:r>
-              <a:rPr b="0" lang="en-US" sz="1000" spc="-1" strike="noStrike">
-                <a:solidFill>
-                  <a:srgbClr val="000000"/>
-                </a:solidFill>
-                <a:latin typeface="Arial"/>
-                <a:ea typeface="Calibri"/>
-              </a:rPr>
-              <a:t> = 179)</a:t>
-            </a:r>
-            <a:endParaRPr b="0" lang="en-GB" sz="1000" spc="-1" strike="noStrike">
-              <a:latin typeface="Arial"/>
-            </a:endParaRPr>
-          </a:p>
-          <a:p>
-            <a:pPr algn="ctr">
-              <a:lnSpc>
-                <a:spcPct val="107000"/>
-              </a:lnSpc>
-              <a:spcAft>
-                <a:spcPts val="799"/>
-              </a:spcAft>
-            </a:pPr>
-            <a:r>
-              <a:rPr b="0" lang="en-US" sz="1000" spc="-1" strike="noStrike">
-                <a:solidFill>
-                  <a:srgbClr val="000000"/>
-                </a:solidFill>
-                <a:latin typeface="Arial"/>
-                <a:ea typeface="Calibri"/>
-              </a:rPr>
-              <a:t> </a:t>
-            </a:r>
-            <a:endParaRPr b="0" lang="en-GB" sz="1000" spc="-1" strike="noStrike">
-              <a:latin typeface="Arial"/>
-            </a:endParaRPr>
-          </a:p>
-        </p:txBody>
-      </p:sp>
-      <p:sp>
-        <p:nvSpPr>
-          <p:cNvPr id="43" name="CustomShape 6"/>
-          <p:cNvSpPr/>
-          <p:nvPr/>
-        </p:nvSpPr>
-        <p:spPr>
-          <a:xfrm>
-            <a:off x="3070800" y="3489840"/>
-            <a:ext cx="2491560" cy="433080"/>
-          </a:xfrm>
-          <a:prstGeom prst="rect">
-            <a:avLst/>
-          </a:prstGeom>
-          <a:solidFill>
-            <a:srgbClr val="ffffff"/>
-          </a:solidFill>
-          <a:ln w="9525">
-            <a:solidFill>
-              <a:srgbClr val="000000"/>
-            </a:solidFill>
-            <a:miter/>
-          </a:ln>
-        </p:spPr>
-        <p:style>
-          <a:lnRef idx="0"/>
-          <a:fillRef idx="0"/>
-          <a:effectRef idx="0"/>
-          <a:fontRef idx="minor"/>
-        </p:style>
-        <p:txBody>
-          <a:bodyPr lIns="90000" rIns="90000" tIns="45000" bIns="45000">
-            <a:noAutofit/>
-          </a:bodyPr>
-          <a:p>
-            <a:pPr algn="ctr">
-              <a:lnSpc>
-                <a:spcPct val="100000"/>
-              </a:lnSpc>
-              <a:spcAft>
-                <a:spcPts val="799"/>
-              </a:spcAft>
-            </a:pPr>
-            <a:r>
-              <a:rPr b="0" lang="en-US" sz="1000" spc="-1" strike="noStrike">
-                <a:solidFill>
-                  <a:srgbClr val="000000"/>
-                </a:solidFill>
-                <a:latin typeface="Arial"/>
-                <a:ea typeface="Calibri"/>
-              </a:rPr>
-              <a:t>Articles conforming to all inclusion criteria (</a:t>
-            </a:r>
-            <a:r>
-              <a:rPr b="0" i="1" lang="en-US" sz="1000" spc="-1" strike="noStrike">
-                <a:solidFill>
-                  <a:srgbClr val="000000"/>
-                </a:solidFill>
-                <a:latin typeface="Arial"/>
-                <a:ea typeface="Calibri"/>
-              </a:rPr>
-              <a:t>k</a:t>
-            </a:r>
-            <a:r>
-              <a:rPr b="0" lang="en-US" sz="1000" spc="-1" strike="noStrike">
-                <a:solidFill>
-                  <a:srgbClr val="000000"/>
-                </a:solidFill>
-                <a:latin typeface="Arial"/>
-                <a:ea typeface="Calibri"/>
-              </a:rPr>
-              <a:t> = 69)</a:t>
-            </a:r>
-            <a:endParaRPr b="0" lang="en-GB" sz="1000" spc="-1" strike="noStrike">
-              <a:latin typeface="Arial"/>
-            </a:endParaRPr>
-          </a:p>
-        </p:txBody>
-      </p:sp>
-      <p:sp>
-        <p:nvSpPr>
-          <p:cNvPr id="44" name="CustomShape 7"/>
-          <p:cNvSpPr/>
-          <p:nvPr/>
-        </p:nvSpPr>
-        <p:spPr>
-          <a:xfrm>
-            <a:off x="6222960" y="2478960"/>
-            <a:ext cx="2894040" cy="3280680"/>
+            <a:off x="6221520" y="2478240"/>
+            <a:ext cx="2893320" cy="3280320"/>
           </a:xfrm>
           <a:prstGeom prst="rect">
             <a:avLst/>
@@ -2371,7 +1804,7 @@
                 <a:latin typeface="Arial"/>
                 <a:ea typeface="Calibri"/>
               </a:rPr>
-              <a:t>Not a decision-making task (</a:t>
+              <a:t>Not a decision making task (</a:t>
             </a:r>
             <a:r>
               <a:rPr b="0" i="1" lang="en-US" sz="1000" spc="-1" strike="noStrike">
@@ -2414,7 +1847,7 @@
                 <a:latin typeface="Arial"/>
                 <a:ea typeface="Calibri"/>
               </a:rPr>
-              <a:t>No effect size on eye tracking (</a:t>
+              <a:t>No effect size on eye-tracking (</a:t>
             </a:r>
             <a:r>
               <a:rPr b="0" i="1" lang="en-US" sz="1000" spc="-1" strike="noStrike">
@@ -2777,264 +2210,2120 @@
           </a:p>
         </p:txBody>
       </p:sp>
-      <p:sp>
-        <p:nvSpPr>
-          <p:cNvPr id="45" name="CustomShape 8"/>
-          <p:cNvSpPr/>
+      <p:grpSp>
+        <p:nvGrpSpPr>
+          <p:cNvPr id="39" name=""/>
+          <p:cNvGrpSpPr/>
           <p:nvPr/>
-        </p:nvSpPr>
-        <p:spPr>
+        </p:nvGrpSpPr>
+        <p:grpSpPr>
           <a:xfrm>
-            <a:off x="4315680" y="1273680"/>
-            <a:ext cx="360" cy="224640"/>
+            <a:off x="3067920" y="686160"/>
+            <a:ext cx="6049080" cy="3236040"/>
+            <a:chOff x="3067920" y="686160"/>
+            <a:chExt cx="6049080" cy="3236040"/>
           </a:xfrm>
-          <a:custGeom>
-            <a:avLst/>
-            <a:gdLst/>
-            <a:ahLst/>
-            <a:rect l="l" t="t" r="r" b="b"/>
-            <a:pathLst>
-              <a:path w="21600" h="21600">
-                <a:moveTo>
-                  <a:pt x="0" y="0"/>
-                </a:moveTo>
-                <a:lnTo>
-                  <a:pt x="21600" y="21600"/>
-                </a:lnTo>
-              </a:path>
-            </a:pathLst>
-          </a:custGeom>
-          <a:noFill/>
-          <a:ln w="9525">
-            <a:solidFill>
-              <a:srgbClr val="000000"/>
-            </a:solidFill>
-            <a:miter/>
-            <a:tailEnd len="med" type="triangle" w="med"/>
-          </a:ln>
-        </p:spPr>
-        <p:style>
-          <a:lnRef idx="0"/>
-          <a:fillRef idx="0"/>
-          <a:effectRef idx="0"/>
-          <a:fontRef idx="minor"/>
-        </p:style>
-      </p:sp>
-      <p:sp>
-        <p:nvSpPr>
-          <p:cNvPr id="46" name="CustomShape 9"/>
-          <p:cNvSpPr/>
-          <p:nvPr/>
-        </p:nvSpPr>
-        <p:spPr>
-          <a:xfrm flipH="1">
-            <a:off x="4314240" y="1932840"/>
-            <a:ext cx="360" cy="545400"/>
-          </a:xfrm>
-          <a:custGeom>
-            <a:avLst/>
-            <a:gdLst/>
-            <a:ahLst/>
-            <a:rect l="l" t="t" r="r" b="b"/>
-            <a:pathLst>
-              <a:path w="21600" h="21600">
-                <a:moveTo>
-                  <a:pt x="0" y="0"/>
-                </a:moveTo>
-                <a:lnTo>
-                  <a:pt x="21600" y="21600"/>
-                </a:lnTo>
-              </a:path>
-            </a:pathLst>
-          </a:custGeom>
-          <a:noFill/>
-          <a:ln w="9525">
-            <a:solidFill>
-              <a:srgbClr val="000000"/>
-            </a:solidFill>
-            <a:miter/>
-            <a:tailEnd len="med" type="triangle" w="med"/>
-          </a:ln>
-        </p:spPr>
-        <p:style>
-          <a:lnRef idx="0"/>
-          <a:fillRef idx="0"/>
-          <a:effectRef idx="0"/>
-          <a:fontRef idx="minor"/>
-        </p:style>
-      </p:sp>
-      <p:sp>
-        <p:nvSpPr>
-          <p:cNvPr id="47" name="CustomShape 10"/>
-          <p:cNvSpPr/>
-          <p:nvPr/>
-        </p:nvSpPr>
-        <p:spPr>
-          <a:xfrm>
-            <a:off x="4316040" y="2912040"/>
-            <a:ext cx="360" cy="576720"/>
-          </a:xfrm>
-          <a:custGeom>
-            <a:avLst/>
-            <a:gdLst/>
-            <a:ahLst/>
-            <a:rect l="l" t="t" r="r" b="b"/>
-            <a:pathLst>
-              <a:path w="21600" h="21600">
-                <a:moveTo>
-                  <a:pt x="0" y="0"/>
-                </a:moveTo>
-                <a:lnTo>
-                  <a:pt x="21600" y="21600"/>
-                </a:lnTo>
-              </a:path>
-            </a:pathLst>
-          </a:custGeom>
-          <a:noFill/>
-          <a:ln w="9525">
-            <a:solidFill>
-              <a:srgbClr val="000000"/>
-            </a:solidFill>
-            <a:miter/>
-            <a:tailEnd len="med" type="triangle" w="med"/>
-          </a:ln>
-        </p:spPr>
-        <p:style>
-          <a:lnRef idx="0"/>
-          <a:fillRef idx="0"/>
-          <a:effectRef idx="0"/>
-          <a:fontRef idx="minor"/>
-        </p:style>
-      </p:sp>
-      <p:sp>
-        <p:nvSpPr>
-          <p:cNvPr id="48" name="CustomShape 11"/>
-          <p:cNvSpPr/>
-          <p:nvPr/>
-        </p:nvSpPr>
-        <p:spPr>
-          <a:xfrm>
-            <a:off x="5562720" y="1715760"/>
-            <a:ext cx="659160" cy="360"/>
-          </a:xfrm>
-          <a:custGeom>
-            <a:avLst/>
-            <a:gdLst/>
-            <a:ahLst/>
-            <a:rect l="l" t="t" r="r" b="b"/>
-            <a:pathLst>
-              <a:path w="21600" h="21600">
-                <a:moveTo>
-                  <a:pt x="0" y="0"/>
-                </a:moveTo>
-                <a:lnTo>
-                  <a:pt x="21600" y="21600"/>
-                </a:lnTo>
-              </a:path>
-            </a:pathLst>
-          </a:custGeom>
-          <a:noFill/>
-          <a:ln w="9525">
-            <a:solidFill>
-              <a:srgbClr val="000000"/>
-            </a:solidFill>
-            <a:miter/>
-            <a:tailEnd len="med" type="triangle" w="med"/>
-          </a:ln>
-        </p:spPr>
-        <p:style>
-          <a:lnRef idx="0"/>
-          <a:fillRef idx="0"/>
-          <a:effectRef idx="0"/>
-          <a:fontRef idx="minor"/>
-        </p:style>
-      </p:sp>
-      <p:sp>
-        <p:nvSpPr>
-          <p:cNvPr id="49" name="CustomShape 12"/>
-          <p:cNvSpPr/>
-          <p:nvPr/>
-        </p:nvSpPr>
-        <p:spPr>
-          <a:xfrm flipV="1">
-            <a:off x="5562000" y="2693520"/>
-            <a:ext cx="659160" cy="360"/>
-          </a:xfrm>
-          <a:custGeom>
-            <a:avLst/>
-            <a:gdLst/>
-            <a:ahLst/>
-            <a:rect l="l" t="t" r="r" b="b"/>
-            <a:pathLst>
-              <a:path w="21600" h="21600">
-                <a:moveTo>
-                  <a:pt x="0" y="0"/>
-                </a:moveTo>
-                <a:lnTo>
-                  <a:pt x="21600" y="21600"/>
-                </a:lnTo>
-              </a:path>
-            </a:pathLst>
-          </a:custGeom>
-          <a:noFill/>
-          <a:ln w="9525">
-            <a:solidFill>
-              <a:srgbClr val="000000"/>
-            </a:solidFill>
-            <a:miter/>
-            <a:tailEnd len="med" type="triangle" w="med"/>
-          </a:ln>
-        </p:spPr>
-        <p:style>
-          <a:lnRef idx="0"/>
-          <a:fillRef idx="0"/>
-          <a:effectRef idx="0"/>
-          <a:fontRef idx="minor"/>
-        </p:style>
-      </p:sp>
-      <p:sp>
-        <p:nvSpPr>
-          <p:cNvPr id="50" name="CustomShape 13"/>
-          <p:cNvSpPr/>
-          <p:nvPr/>
-        </p:nvSpPr>
-        <p:spPr>
-          <a:xfrm>
-            <a:off x="5562720" y="973440"/>
-            <a:ext cx="659160" cy="360"/>
-          </a:xfrm>
-          <a:custGeom>
-            <a:avLst/>
-            <a:gdLst/>
-            <a:ahLst/>
-            <a:rect l="l" t="t" r="r" b="b"/>
-            <a:pathLst>
-              <a:path w="21600" h="21600">
-                <a:moveTo>
-                  <a:pt x="0" y="0"/>
-                </a:moveTo>
-                <a:lnTo>
-                  <a:pt x="21600" y="21600"/>
-                </a:lnTo>
-              </a:path>
-            </a:pathLst>
-          </a:custGeom>
-          <a:noFill/>
-          <a:ln w="9525">
-            <a:solidFill>
-              <a:srgbClr val="000000"/>
-            </a:solidFill>
-            <a:miter/>
-            <a:tailEnd len="med" type="triangle" w="med"/>
-          </a:ln>
-        </p:spPr>
-        <p:style>
-          <a:lnRef idx="0"/>
-          <a:fillRef idx="0"/>
-          <a:effectRef idx="0"/>
-          <a:fontRef idx="minor"/>
-        </p:style>
-      </p:sp>
+        </p:grpSpPr>
+        <p:grpSp>
+          <p:nvGrpSpPr>
+            <p:cNvPr id="40" name=""/>
+            <p:cNvGrpSpPr/>
+            <p:nvPr/>
+          </p:nvGrpSpPr>
+          <p:grpSpPr>
+            <a:xfrm>
+              <a:off x="3067920" y="686160"/>
+              <a:ext cx="6049080" cy="3236040"/>
+              <a:chOff x="3067920" y="686160"/>
+              <a:chExt cx="6049080" cy="3236040"/>
+            </a:xfrm>
+          </p:grpSpPr>
+          <p:sp>
+            <p:nvSpPr>
+              <p:cNvPr id="41" name="CustomShape 1"/>
+              <p:cNvSpPr/>
+              <p:nvPr/>
+            </p:nvSpPr>
+            <p:spPr>
+              <a:xfrm>
+                <a:off x="3067920" y="686160"/>
+                <a:ext cx="2490840" cy="586800"/>
+              </a:xfrm>
+              <a:prstGeom prst="rect">
+                <a:avLst/>
+              </a:prstGeom>
+              <a:solidFill>
+                <a:srgbClr val="ffffff"/>
+              </a:solidFill>
+              <a:ln w="9525">
+                <a:solidFill>
+                  <a:srgbClr val="000000"/>
+                </a:solidFill>
+                <a:miter/>
+              </a:ln>
+            </p:spPr>
+            <p:style>
+              <a:lnRef idx="0"/>
+              <a:fillRef idx="0"/>
+              <a:effectRef idx="0"/>
+              <a:fontRef idx="minor"/>
+            </p:style>
+            <p:txBody>
+              <a:bodyPr lIns="90000" rIns="90000" tIns="45000" bIns="45000">
+                <a:noAutofit/>
+              </a:bodyPr>
+              <a:p>
+                <a:pPr algn="ctr">
+                  <a:lnSpc>
+                    <a:spcPct val="100000"/>
+                  </a:lnSpc>
+                  <a:spcAft>
+                    <a:spcPts val="799"/>
+                  </a:spcAft>
+                </a:pPr>
+                <a:r>
+                  <a:rPr b="0" lang="en-US" sz="1000" spc="-1" strike="noStrike">
+                    <a:solidFill>
+                      <a:srgbClr val="000000"/>
+                    </a:solidFill>
+                    <a:latin typeface="Arial"/>
+                    <a:ea typeface="Calibri"/>
+                  </a:rPr>
+                  <a:t>Re</a:t>
+                </a:r>
+                <a:r>
+                  <a:rPr b="0" lang="en-US" sz="1000" spc="-1" strike="noStrike">
+                    <a:solidFill>
+                      <a:srgbClr val="000000"/>
+                    </a:solidFill>
+                    <a:latin typeface="Arial"/>
+                    <a:ea typeface="Calibri"/>
+                  </a:rPr>
+                  <a:t>cor</a:t>
+                </a:r>
+                <a:r>
+                  <a:rPr b="0" lang="en-US" sz="1000" spc="-1" strike="noStrike">
+                    <a:solidFill>
+                      <a:srgbClr val="000000"/>
+                    </a:solidFill>
+                    <a:latin typeface="Arial"/>
+                    <a:ea typeface="Calibri"/>
+                  </a:rPr>
+                  <a:t>ds </a:t>
+                </a:r>
+                <a:r>
+                  <a:rPr b="0" lang="en-US" sz="1000" spc="-1" strike="noStrike">
+                    <a:solidFill>
+                      <a:srgbClr val="000000"/>
+                    </a:solidFill>
+                    <a:latin typeface="Arial"/>
+                    <a:ea typeface="Calibri"/>
+                  </a:rPr>
+                  <a:t>ide</a:t>
+                </a:r>
+                <a:r>
+                  <a:rPr b="0" lang="en-US" sz="1000" spc="-1" strike="noStrike">
+                    <a:solidFill>
+                      <a:srgbClr val="000000"/>
+                    </a:solidFill>
+                    <a:latin typeface="Arial"/>
+                    <a:ea typeface="Calibri"/>
+                  </a:rPr>
+                  <a:t>ntif</a:t>
+                </a:r>
+                <a:r>
+                  <a:rPr b="0" lang="en-US" sz="1000" spc="-1" strike="noStrike">
+                    <a:solidFill>
+                      <a:srgbClr val="000000"/>
+                    </a:solidFill>
+                    <a:latin typeface="Arial"/>
+                    <a:ea typeface="Calibri"/>
+                  </a:rPr>
+                  <a:t>ied </a:t>
+                </a:r>
+                <a:r>
+                  <a:rPr b="0" lang="en-US" sz="1000" spc="-1" strike="noStrike">
+                    <a:solidFill>
+                      <a:srgbClr val="000000"/>
+                    </a:solidFill>
+                    <a:latin typeface="Arial"/>
+                    <a:ea typeface="Calibri"/>
+                  </a:rPr>
+                  <a:t>thr</a:t>
+                </a:r>
+                <a:r>
+                  <a:rPr b="0" lang="en-US" sz="1000" spc="-1" strike="noStrike">
+                    <a:solidFill>
+                      <a:srgbClr val="000000"/>
+                    </a:solidFill>
+                    <a:latin typeface="Arial"/>
+                    <a:ea typeface="Calibri"/>
+                  </a:rPr>
+                  <a:t>ou</a:t>
+                </a:r>
+                <a:r>
+                  <a:rPr b="0" lang="en-US" sz="1000" spc="-1" strike="noStrike">
+                    <a:solidFill>
+                      <a:srgbClr val="000000"/>
+                    </a:solidFill>
+                    <a:latin typeface="Arial"/>
+                    <a:ea typeface="Calibri"/>
+                  </a:rPr>
+                  <a:t>gh </a:t>
+                </a:r>
+                <a:r>
+                  <a:rPr b="0" lang="en-US" sz="1000" spc="-1" strike="noStrike">
+                    <a:solidFill>
+                      <a:srgbClr val="000000"/>
+                    </a:solidFill>
+                    <a:latin typeface="Arial"/>
+                    <a:ea typeface="Calibri"/>
+                  </a:rPr>
+                  <a:t>dat</a:t>
+                </a:r>
+                <a:r>
+                  <a:rPr b="0" lang="en-US" sz="1000" spc="-1" strike="noStrike">
+                    <a:solidFill>
+                      <a:srgbClr val="000000"/>
+                    </a:solidFill>
+                    <a:latin typeface="Arial"/>
+                    <a:ea typeface="Calibri"/>
+                  </a:rPr>
+                  <a:t>ab</a:t>
+                </a:r>
+                <a:r>
+                  <a:rPr b="0" lang="en-US" sz="1000" spc="-1" strike="noStrike">
+                    <a:solidFill>
+                      <a:srgbClr val="000000"/>
+                    </a:solidFill>
+                    <a:latin typeface="Arial"/>
+                    <a:ea typeface="Calibri"/>
+                  </a:rPr>
+                  <a:t>as</a:t>
+                </a:r>
+                <a:r>
+                  <a:rPr b="0" lang="en-US" sz="1000" spc="-1" strike="noStrike">
+                    <a:solidFill>
+                      <a:srgbClr val="000000"/>
+                    </a:solidFill>
+                    <a:latin typeface="Arial"/>
+                    <a:ea typeface="Calibri"/>
+                  </a:rPr>
+                  <a:t>e </a:t>
+                </a:r>
+                <a:r>
+                  <a:rPr b="0" lang="en-US" sz="1000" spc="-1" strike="noStrike">
+                    <a:solidFill>
+                      <a:srgbClr val="000000"/>
+                    </a:solidFill>
+                    <a:latin typeface="Arial"/>
+                    <a:ea typeface="Calibri"/>
+                  </a:rPr>
+                  <a:t>se</a:t>
+                </a:r>
+                <a:r>
+                  <a:rPr b="0" lang="en-US" sz="1000" spc="-1" strike="noStrike">
+                    <a:solidFill>
+                      <a:srgbClr val="000000"/>
+                    </a:solidFill>
+                    <a:latin typeface="Arial"/>
+                    <a:ea typeface="Calibri"/>
+                  </a:rPr>
+                  <a:t>arc</a:t>
+                </a:r>
+                <a:r>
+                  <a:rPr b="0" lang="en-US" sz="1000" spc="-1" strike="noStrike">
+                    <a:solidFill>
+                      <a:srgbClr val="000000"/>
+                    </a:solidFill>
+                    <a:latin typeface="Arial"/>
+                    <a:ea typeface="Calibri"/>
+                  </a:rPr>
+                  <a:t>h </a:t>
+                </a:r>
+                <a:r>
+                  <a:rPr b="0" lang="en-US" sz="1000" spc="-1" strike="noStrike">
+                    <a:solidFill>
+                      <a:srgbClr val="000000"/>
+                    </a:solidFill>
+                    <a:latin typeface="Arial"/>
+                    <a:ea typeface="Calibri"/>
+                  </a:rPr>
+                  <a:t>an</a:t>
+                </a:r>
+                <a:r>
+                  <a:rPr b="0" lang="en-US" sz="1000" spc="-1" strike="noStrike">
+                    <a:solidFill>
+                      <a:srgbClr val="000000"/>
+                    </a:solidFill>
+                    <a:latin typeface="Arial"/>
+                    <a:ea typeface="Calibri"/>
+                  </a:rPr>
+                  <a:t>d </a:t>
+                </a:r>
+                <a:r>
+                  <a:rPr b="0" lang="en-US" sz="1000" spc="-1" strike="noStrike">
+                    <a:solidFill>
+                      <a:srgbClr val="000000"/>
+                    </a:solidFill>
+                    <a:latin typeface="Arial"/>
+                    <a:ea typeface="Calibri"/>
+                  </a:rPr>
+                  <a:t>scr</a:t>
+                </a:r>
+                <a:r>
+                  <a:rPr b="0" lang="en-US" sz="1000" spc="-1" strike="noStrike">
+                    <a:solidFill>
+                      <a:srgbClr val="000000"/>
+                    </a:solidFill>
+                    <a:latin typeface="Arial"/>
+                    <a:ea typeface="Calibri"/>
+                  </a:rPr>
+                  <a:t>ee</a:t>
+                </a:r>
+                <a:r>
+                  <a:rPr b="0" lang="en-US" sz="1000" spc="-1" strike="noStrike">
+                    <a:solidFill>
+                      <a:srgbClr val="000000"/>
+                    </a:solidFill>
+                    <a:latin typeface="Arial"/>
+                    <a:ea typeface="Calibri"/>
+                  </a:rPr>
+                  <a:t>ne</a:t>
+                </a:r>
+                <a:r>
+                  <a:rPr b="0" lang="en-US" sz="1000" spc="-1" strike="noStrike">
+                    <a:solidFill>
+                      <a:srgbClr val="000000"/>
+                    </a:solidFill>
+                    <a:latin typeface="Arial"/>
+                    <a:ea typeface="Calibri"/>
+                  </a:rPr>
+                  <a:t>d </a:t>
+                </a:r>
+                <a:r>
+                  <a:rPr b="0" lang="en-US" sz="1000" spc="-1" strike="noStrike">
+                    <a:solidFill>
+                      <a:srgbClr val="000000"/>
+                    </a:solidFill>
+                    <a:latin typeface="Arial"/>
+                    <a:ea typeface="Calibri"/>
+                  </a:rPr>
+                  <a:t>by </a:t>
+                </a:r>
+                <a:r>
+                  <a:rPr b="0" lang="en-US" sz="1000" spc="-1" strike="noStrike">
+                    <a:solidFill>
+                      <a:srgbClr val="000000"/>
+                    </a:solidFill>
+                    <a:latin typeface="Arial"/>
+                    <a:ea typeface="Calibri"/>
+                  </a:rPr>
+                  <a:t>ab</a:t>
+                </a:r>
+                <a:r>
+                  <a:rPr b="0" lang="en-US" sz="1000" spc="-1" strike="noStrike">
+                    <a:solidFill>
+                      <a:srgbClr val="000000"/>
+                    </a:solidFill>
+                    <a:latin typeface="Arial"/>
+                    <a:ea typeface="Calibri"/>
+                  </a:rPr>
+                  <a:t>str</a:t>
+                </a:r>
+                <a:r>
+                  <a:rPr b="0" lang="en-US" sz="1000" spc="-1" strike="noStrike">
+                    <a:solidFill>
+                      <a:srgbClr val="000000"/>
+                    </a:solidFill>
+                    <a:latin typeface="Arial"/>
+                    <a:ea typeface="Calibri"/>
+                  </a:rPr>
+                  <a:t>act </a:t>
+                </a:r>
+                <a:r>
+                  <a:rPr b="0" lang="en-US" sz="1000" spc="-1" strike="noStrike">
+                    <a:solidFill>
+                      <a:srgbClr val="000000"/>
+                    </a:solidFill>
+                    <a:latin typeface="Arial"/>
+                    <a:ea typeface="Calibri"/>
+                  </a:rPr>
+                  <a:t>     </a:t>
+                </a:r>
+                <a:r>
+                  <a:rPr b="0" lang="en-US" sz="1000" spc="-1" strike="noStrike">
+                    <a:solidFill>
+                      <a:srgbClr val="000000"/>
+                    </a:solidFill>
+                    <a:latin typeface="Arial"/>
+                    <a:ea typeface="Calibri"/>
+                  </a:rPr>
+                  <a:t>     </a:t>
+                </a:r>
+                <a:r>
+                  <a:rPr b="0" lang="en-US" sz="1000" spc="-1" strike="noStrike">
+                    <a:solidFill>
+                      <a:srgbClr val="000000"/>
+                    </a:solidFill>
+                    <a:latin typeface="Arial"/>
+                    <a:ea typeface="Calibri"/>
+                  </a:rPr>
+                  <a:t>  </a:t>
+                </a:r>
+                <a:r>
+                  <a:rPr b="0" lang="en-US" sz="1000" spc="-1" strike="noStrike">
+                    <a:solidFill>
+                      <a:srgbClr val="000000"/>
+                    </a:solidFill>
+                    <a:latin typeface="Arial"/>
+                    <a:ea typeface="Calibri"/>
+                  </a:rPr>
+                  <a:t>(</a:t>
+                </a:r>
+                <a:r>
+                  <a:rPr b="0" i="1" lang="en-US" sz="1000" spc="-1" strike="noStrike">
+                    <a:solidFill>
+                      <a:srgbClr val="000000"/>
+                    </a:solidFill>
+                    <a:latin typeface="Arial"/>
+                    <a:ea typeface="Calibri"/>
+                  </a:rPr>
+                  <a:t>k </a:t>
+                </a:r>
+                <a:r>
+                  <a:rPr b="0" lang="en-US" sz="1000" spc="-1" strike="noStrike">
+                    <a:solidFill>
+                      <a:srgbClr val="000000"/>
+                    </a:solidFill>
+                    <a:latin typeface="Arial"/>
+                    <a:ea typeface="Calibri"/>
+                  </a:rPr>
+                  <a:t>=2</a:t>
+                </a:r>
+                <a:r>
+                  <a:rPr b="0" lang="en-US" sz="1000" spc="-1" strike="noStrike">
+                    <a:solidFill>
+                      <a:srgbClr val="000000"/>
+                    </a:solidFill>
+                    <a:latin typeface="Arial"/>
+                    <a:ea typeface="Calibri"/>
+                  </a:rPr>
+                  <a:t>95</a:t>
+                </a:r>
+                <a:r>
+                  <a:rPr b="0" lang="en-US" sz="1000" spc="-1" strike="noStrike">
+                    <a:solidFill>
+                      <a:srgbClr val="000000"/>
+                    </a:solidFill>
+                    <a:latin typeface="Arial"/>
+                    <a:ea typeface="Calibri"/>
+                  </a:rPr>
+                  <a:t>6)</a:t>
+                </a:r>
+                <a:endParaRPr b="0" lang="en-GB" sz="1000" spc="-1" strike="noStrike">
+                  <a:latin typeface="Arial"/>
+                </a:endParaRPr>
+              </a:p>
+              <a:p>
+                <a:pPr algn="ctr">
+                  <a:lnSpc>
+                    <a:spcPct val="107000"/>
+                  </a:lnSpc>
+                  <a:spcAft>
+                    <a:spcPts val="799"/>
+                  </a:spcAft>
+                </a:pPr>
+                <a:r>
+                  <a:rPr b="0" lang="en-US" sz="1000" spc="-1" strike="noStrike">
+                    <a:solidFill>
+                      <a:srgbClr val="000000"/>
+                    </a:solidFill>
+                    <a:latin typeface="Arial"/>
+                    <a:ea typeface="Calibri"/>
+                  </a:rPr>
+                  <a:t> </a:t>
+                </a:r>
+                <a:endParaRPr b="0" lang="en-GB" sz="1000" spc="-1" strike="noStrike">
+                  <a:latin typeface="Arial"/>
+                </a:endParaRPr>
+              </a:p>
+            </p:txBody>
+          </p:sp>
+          <p:sp>
+            <p:nvSpPr>
+              <p:cNvPr id="42" name="CustomShape 2"/>
+              <p:cNvSpPr/>
+              <p:nvPr/>
+            </p:nvSpPr>
+            <p:spPr>
+              <a:xfrm>
+                <a:off x="3069000" y="1499040"/>
+                <a:ext cx="2491200" cy="432720"/>
+              </a:xfrm>
+              <a:prstGeom prst="rect">
+                <a:avLst/>
+              </a:prstGeom>
+              <a:solidFill>
+                <a:srgbClr val="ffffff"/>
+              </a:solidFill>
+              <a:ln w="9525">
+                <a:solidFill>
+                  <a:srgbClr val="000000"/>
+                </a:solidFill>
+                <a:miter/>
+              </a:ln>
+            </p:spPr>
+            <p:style>
+              <a:lnRef idx="0"/>
+              <a:fillRef idx="0"/>
+              <a:effectRef idx="0"/>
+              <a:fontRef idx="minor"/>
+            </p:style>
+            <p:txBody>
+              <a:bodyPr lIns="90000" rIns="90000" tIns="45000" bIns="45000">
+                <a:noAutofit/>
+              </a:bodyPr>
+              <a:p>
+                <a:pPr algn="ctr">
+                  <a:lnSpc>
+                    <a:spcPct val="100000"/>
+                  </a:lnSpc>
+                  <a:spcAft>
+                    <a:spcPts val="799"/>
+                  </a:spcAft>
+                </a:pPr>
+                <a:r>
+                  <a:rPr b="0" lang="en-US" sz="1000" spc="-1" strike="noStrike">
+                    <a:solidFill>
+                      <a:srgbClr val="000000"/>
+                    </a:solidFill>
+                    <a:latin typeface="Arial"/>
+                    <a:ea typeface="Calibri"/>
+                  </a:rPr>
+                  <a:t>Rec</a:t>
+                </a:r>
+                <a:r>
+                  <a:rPr b="0" lang="en-US" sz="1000" spc="-1" strike="noStrike">
+                    <a:solidFill>
+                      <a:srgbClr val="000000"/>
+                    </a:solidFill>
+                    <a:latin typeface="Arial"/>
+                    <a:ea typeface="Calibri"/>
+                  </a:rPr>
+                  <a:t>ords </a:t>
+                </a:r>
+                <a:r>
+                  <a:rPr b="0" lang="en-US" sz="1000" spc="-1" strike="noStrike">
+                    <a:solidFill>
+                      <a:srgbClr val="000000"/>
+                    </a:solidFill>
+                    <a:latin typeface="Arial"/>
+                    <a:ea typeface="Calibri"/>
+                  </a:rPr>
+                  <a:t>sele</a:t>
+                </a:r>
+                <a:r>
+                  <a:rPr b="0" lang="en-US" sz="1000" spc="-1" strike="noStrike">
+                    <a:solidFill>
+                      <a:srgbClr val="000000"/>
+                    </a:solidFill>
+                    <a:latin typeface="Arial"/>
+                    <a:ea typeface="Calibri"/>
+                  </a:rPr>
+                  <a:t>cted </a:t>
+                </a:r>
+                <a:r>
+                  <a:rPr b="0" lang="en-US" sz="1000" spc="-1" strike="noStrike">
+                    <a:solidFill>
+                      <a:srgbClr val="000000"/>
+                    </a:solidFill>
+                    <a:latin typeface="Arial"/>
+                    <a:ea typeface="Calibri"/>
+                  </a:rPr>
+                  <a:t>for </a:t>
+                </a:r>
+                <a:r>
+                  <a:rPr b="0" lang="en-US" sz="1000" spc="-1" strike="noStrike">
+                    <a:solidFill>
+                      <a:srgbClr val="000000"/>
+                    </a:solidFill>
+                    <a:latin typeface="Arial"/>
+                    <a:ea typeface="Calibri"/>
+                  </a:rPr>
+                  <a:t>more </a:t>
+                </a:r>
+                <a:r>
+                  <a:rPr b="0" lang="en-US" sz="1000" spc="-1" strike="noStrike">
+                    <a:solidFill>
+                      <a:srgbClr val="000000"/>
+                    </a:solidFill>
+                    <a:latin typeface="Arial"/>
+                    <a:ea typeface="Calibri"/>
+                  </a:rPr>
+                  <a:t>detai</a:t>
+                </a:r>
+                <a:r>
+                  <a:rPr b="0" lang="en-US" sz="1000" spc="-1" strike="noStrike">
+                    <a:solidFill>
+                      <a:srgbClr val="000000"/>
+                    </a:solidFill>
+                    <a:latin typeface="Arial"/>
+                    <a:ea typeface="Calibri"/>
+                  </a:rPr>
+                  <a:t>led </a:t>
+                </a:r>
+                <a:r>
+                  <a:rPr b="0" lang="en-US" sz="1000" spc="-1" strike="noStrike">
+                    <a:solidFill>
+                      <a:srgbClr val="000000"/>
+                    </a:solidFill>
+                    <a:latin typeface="Arial"/>
+                    <a:ea typeface="Calibri"/>
+                  </a:rPr>
+                  <a:t>eval</a:t>
+                </a:r>
+                <a:r>
+                  <a:rPr b="0" lang="en-US" sz="1000" spc="-1" strike="noStrike">
+                    <a:solidFill>
+                      <a:srgbClr val="000000"/>
+                    </a:solidFill>
+                    <a:latin typeface="Arial"/>
+                    <a:ea typeface="Calibri"/>
+                  </a:rPr>
+                  <a:t>uatio</a:t>
+                </a:r>
+                <a:r>
+                  <a:rPr b="0" lang="en-US" sz="1000" spc="-1" strike="noStrike">
+                    <a:solidFill>
+                      <a:srgbClr val="000000"/>
+                    </a:solidFill>
+                    <a:latin typeface="Arial"/>
+                    <a:ea typeface="Calibri"/>
+                  </a:rPr>
+                  <a:t>n (</a:t>
+                </a:r>
+                <a:r>
+                  <a:rPr b="0" i="1" lang="en-US" sz="1000" spc="-1" strike="noStrike">
+                    <a:solidFill>
+                      <a:srgbClr val="000000"/>
+                    </a:solidFill>
+                    <a:latin typeface="Arial"/>
+                    <a:ea typeface="Calibri"/>
+                  </a:rPr>
+                  <a:t>k </a:t>
+                </a:r>
+                <a:r>
+                  <a:rPr b="0" lang="en-US" sz="1000" spc="-1" strike="noStrike">
+                    <a:solidFill>
+                      <a:srgbClr val="000000"/>
+                    </a:solidFill>
+                    <a:latin typeface="Arial"/>
+                    <a:ea typeface="Calibri"/>
+                  </a:rPr>
+                  <a:t>= </a:t>
+                </a:r>
+                <a:r>
+                  <a:rPr b="0" lang="en-US" sz="1000" spc="-1" strike="noStrike">
+                    <a:solidFill>
+                      <a:srgbClr val="000000"/>
+                    </a:solidFill>
+                    <a:latin typeface="Arial"/>
+                    <a:ea typeface="Calibri"/>
+                  </a:rPr>
+                  <a:t>591)</a:t>
+                </a:r>
+                <a:endParaRPr b="0" lang="en-GB" sz="1000" spc="-1" strike="noStrike">
+                  <a:latin typeface="Arial"/>
+                </a:endParaRPr>
+              </a:p>
+            </p:txBody>
+          </p:sp>
+          <p:sp>
+            <p:nvSpPr>
+              <p:cNvPr id="43" name="CustomShape 3"/>
+              <p:cNvSpPr/>
+              <p:nvPr/>
+            </p:nvSpPr>
+            <p:spPr>
+              <a:xfrm>
+                <a:off x="6220440" y="686160"/>
+                <a:ext cx="2896560" cy="507240"/>
+              </a:xfrm>
+              <a:prstGeom prst="rect">
+                <a:avLst/>
+              </a:prstGeom>
+              <a:solidFill>
+                <a:srgbClr val="ffffff"/>
+              </a:solidFill>
+              <a:ln w="9525">
+                <a:solidFill>
+                  <a:srgbClr val="000000"/>
+                </a:solidFill>
+                <a:miter/>
+              </a:ln>
+            </p:spPr>
+            <p:style>
+              <a:lnRef idx="0"/>
+              <a:fillRef idx="0"/>
+              <a:effectRef idx="0"/>
+              <a:fontRef idx="minor"/>
+            </p:style>
+            <p:txBody>
+              <a:bodyPr lIns="90000" rIns="90000" tIns="45000" bIns="45000">
+                <a:noAutofit/>
+              </a:bodyPr>
+              <a:p>
+                <a:pPr>
+                  <a:lnSpc>
+                    <a:spcPct val="100000"/>
+                  </a:lnSpc>
+                  <a:spcAft>
+                    <a:spcPts val="799"/>
+                  </a:spcAft>
+                </a:pPr>
+                <a:r>
+                  <a:rPr b="0" lang="en-US" sz="1000" spc="-1" strike="noStrike">
+                    <a:solidFill>
+                      <a:srgbClr val="000000"/>
+                    </a:solidFill>
+                    <a:latin typeface="Arial"/>
+                    <a:ea typeface="Calibri"/>
+                  </a:rPr>
+                  <a:t>Re</a:t>
+                </a:r>
+                <a:r>
+                  <a:rPr b="0" lang="en-US" sz="1000" spc="-1" strike="noStrike">
+                    <a:solidFill>
+                      <a:srgbClr val="000000"/>
+                    </a:solidFill>
+                    <a:latin typeface="Arial"/>
+                    <a:ea typeface="Calibri"/>
+                  </a:rPr>
+                  <a:t>cor</a:t>
+                </a:r>
+                <a:r>
+                  <a:rPr b="0" lang="en-US" sz="1000" spc="-1" strike="noStrike">
+                    <a:solidFill>
+                      <a:srgbClr val="000000"/>
+                    </a:solidFill>
+                    <a:latin typeface="Arial"/>
+                    <a:ea typeface="Calibri"/>
+                  </a:rPr>
+                  <a:t>ds </a:t>
+                </a:r>
+                <a:r>
+                  <a:rPr b="0" lang="en-US" sz="1000" spc="-1" strike="noStrike">
+                    <a:solidFill>
+                      <a:srgbClr val="000000"/>
+                    </a:solidFill>
+                    <a:latin typeface="Arial"/>
+                    <a:ea typeface="Calibri"/>
+                  </a:rPr>
+                  <a:t>ex</a:t>
+                </a:r>
+                <a:r>
+                  <a:rPr b="0" lang="en-US" sz="1000" spc="-1" strike="noStrike">
+                    <a:solidFill>
+                      <a:srgbClr val="000000"/>
+                    </a:solidFill>
+                    <a:latin typeface="Arial"/>
+                    <a:ea typeface="Calibri"/>
+                  </a:rPr>
+                  <a:t>clu</a:t>
+                </a:r>
+                <a:r>
+                  <a:rPr b="0" lang="en-US" sz="1000" spc="-1" strike="noStrike">
+                    <a:solidFill>
+                      <a:srgbClr val="000000"/>
+                    </a:solidFill>
+                    <a:latin typeface="Arial"/>
+                    <a:ea typeface="Calibri"/>
+                  </a:rPr>
+                  <a:t>de</a:t>
+                </a:r>
+                <a:r>
+                  <a:rPr b="0" lang="en-US" sz="1000" spc="-1" strike="noStrike">
+                    <a:solidFill>
+                      <a:srgbClr val="000000"/>
+                    </a:solidFill>
+                    <a:latin typeface="Arial"/>
+                    <a:ea typeface="Calibri"/>
+                  </a:rPr>
+                  <a:t>d:</a:t>
+                </a:r>
+                <a:endParaRPr b="0" lang="en-GB" sz="1000" spc="-1" strike="noStrike">
+                  <a:latin typeface="Arial"/>
+                </a:endParaRPr>
+              </a:p>
+              <a:p>
+                <a:pPr>
+                  <a:lnSpc>
+                    <a:spcPct val="100000"/>
+                  </a:lnSpc>
+                  <a:spcAft>
+                    <a:spcPts val="799"/>
+                  </a:spcAft>
+                </a:pPr>
+                <a:r>
+                  <a:rPr b="0" lang="en-US" sz="1000" spc="-1" strike="noStrike">
+                    <a:solidFill>
+                      <a:srgbClr val="000000"/>
+                    </a:solidFill>
+                    <a:latin typeface="Arial"/>
+                    <a:ea typeface="Calibri"/>
+                  </a:rPr>
+                  <a:t>Titl</a:t>
+                </a:r>
+                <a:r>
+                  <a:rPr b="0" lang="en-US" sz="1000" spc="-1" strike="noStrike">
+                    <a:solidFill>
+                      <a:srgbClr val="000000"/>
+                    </a:solidFill>
+                    <a:latin typeface="Arial"/>
+                    <a:ea typeface="Calibri"/>
+                  </a:rPr>
+                  <a:t>e </a:t>
+                </a:r>
+                <a:r>
+                  <a:rPr b="0" lang="en-US" sz="1000" spc="-1" strike="noStrike">
+                    <a:solidFill>
+                      <a:srgbClr val="000000"/>
+                    </a:solidFill>
+                    <a:latin typeface="Arial"/>
+                    <a:ea typeface="Calibri"/>
+                  </a:rPr>
+                  <a:t>an</a:t>
+                </a:r>
+                <a:r>
+                  <a:rPr b="0" lang="en-US" sz="1000" spc="-1" strike="noStrike">
+                    <a:solidFill>
+                      <a:srgbClr val="000000"/>
+                    </a:solidFill>
+                    <a:latin typeface="Arial"/>
+                    <a:ea typeface="Calibri"/>
+                  </a:rPr>
+                  <a:t>d </a:t>
+                </a:r>
+                <a:r>
+                  <a:rPr b="0" lang="en-US" sz="1000" spc="-1" strike="noStrike">
+                    <a:solidFill>
+                      <a:srgbClr val="000000"/>
+                    </a:solidFill>
+                    <a:latin typeface="Arial"/>
+                    <a:ea typeface="Calibri"/>
+                  </a:rPr>
+                  <a:t>ab</a:t>
+                </a:r>
+                <a:r>
+                  <a:rPr b="0" lang="en-US" sz="1000" spc="-1" strike="noStrike">
+                    <a:solidFill>
+                      <a:srgbClr val="000000"/>
+                    </a:solidFill>
+                    <a:latin typeface="Arial"/>
+                    <a:ea typeface="Calibri"/>
+                  </a:rPr>
+                  <a:t>str</a:t>
+                </a:r>
+                <a:r>
+                  <a:rPr b="0" lang="en-US" sz="1000" spc="-1" strike="noStrike">
+                    <a:solidFill>
+                      <a:srgbClr val="000000"/>
+                    </a:solidFill>
+                    <a:latin typeface="Arial"/>
+                    <a:ea typeface="Calibri"/>
+                  </a:rPr>
+                  <a:t>act </a:t>
+                </a:r>
+                <a:r>
+                  <a:rPr b="0" lang="en-US" sz="1000" spc="-1" strike="noStrike">
+                    <a:solidFill>
+                      <a:srgbClr val="000000"/>
+                    </a:solidFill>
+                    <a:latin typeface="Arial"/>
+                    <a:ea typeface="Calibri"/>
+                  </a:rPr>
+                  <a:t>not </a:t>
+                </a:r>
+                <a:r>
+                  <a:rPr b="0" lang="en-US" sz="1000" spc="-1" strike="noStrike">
+                    <a:solidFill>
+                      <a:srgbClr val="000000"/>
+                    </a:solidFill>
+                    <a:latin typeface="Arial"/>
+                    <a:ea typeface="Calibri"/>
+                  </a:rPr>
+                  <a:t>rel</a:t>
+                </a:r>
+                <a:r>
+                  <a:rPr b="0" lang="en-US" sz="1000" spc="-1" strike="noStrike">
+                    <a:solidFill>
+                      <a:srgbClr val="000000"/>
+                    </a:solidFill>
+                    <a:latin typeface="Arial"/>
+                    <a:ea typeface="Calibri"/>
+                  </a:rPr>
+                  <a:t>ev</a:t>
+                </a:r>
+                <a:r>
+                  <a:rPr b="0" lang="en-US" sz="1000" spc="-1" strike="noStrike">
+                    <a:solidFill>
+                      <a:srgbClr val="000000"/>
+                    </a:solidFill>
+                    <a:latin typeface="Arial"/>
+                    <a:ea typeface="Calibri"/>
+                  </a:rPr>
+                  <a:t>ant </a:t>
+                </a:r>
+                <a:r>
+                  <a:rPr b="0" lang="en-US" sz="1000" spc="-1" strike="noStrike">
+                    <a:solidFill>
+                      <a:srgbClr val="000000"/>
+                    </a:solidFill>
+                    <a:latin typeface="Arial"/>
+                    <a:ea typeface="Calibri"/>
+                  </a:rPr>
+                  <a:t>(</a:t>
+                </a:r>
+                <a:r>
+                  <a:rPr b="0" i="1" lang="en-US" sz="1000" spc="-1" strike="noStrike">
+                    <a:solidFill>
+                      <a:srgbClr val="000000"/>
+                    </a:solidFill>
+                    <a:latin typeface="Arial"/>
+                    <a:ea typeface="Calibri"/>
+                  </a:rPr>
+                  <a:t>k </a:t>
+                </a:r>
+                <a:r>
+                  <a:rPr b="0" i="1" lang="en-US" sz="1000" spc="-1" strike="noStrike">
+                    <a:solidFill>
+                      <a:srgbClr val="000000"/>
+                    </a:solidFill>
+                    <a:latin typeface="Arial"/>
+                    <a:ea typeface="Calibri"/>
+                  </a:rPr>
+                  <a:t>= </a:t>
+                </a:r>
+                <a:r>
+                  <a:rPr b="0" lang="en-US" sz="1000" spc="-1" strike="noStrike">
+                    <a:solidFill>
+                      <a:srgbClr val="000000"/>
+                    </a:solidFill>
+                    <a:latin typeface="Arial"/>
+                    <a:ea typeface="Calibri"/>
+                  </a:rPr>
+                  <a:t>23</a:t>
+                </a:r>
+                <a:r>
+                  <a:rPr b="0" lang="en-US" sz="1000" spc="-1" strike="noStrike">
+                    <a:solidFill>
+                      <a:srgbClr val="000000"/>
+                    </a:solidFill>
+                    <a:latin typeface="Arial"/>
+                    <a:ea typeface="Calibri"/>
+                  </a:rPr>
+                  <a:t>65)</a:t>
+                </a:r>
+                <a:r>
+                  <a:rPr b="0" lang="en-US" sz="1000" spc="-1" strike="noStrike">
+                    <a:solidFill>
+                      <a:srgbClr val="000000"/>
+                    </a:solidFill>
+                    <a:latin typeface="Arial"/>
+                    <a:ea typeface="Calibri"/>
+                  </a:rPr>
+                  <a:t> </a:t>
+                </a:r>
+                <a:endParaRPr b="0" lang="en-GB" sz="1000" spc="-1" strike="noStrike">
+                  <a:latin typeface="Arial"/>
+                </a:endParaRPr>
+              </a:p>
+            </p:txBody>
+          </p:sp>
+          <p:sp>
+            <p:nvSpPr>
+              <p:cNvPr id="44" name="CustomShape 4"/>
+              <p:cNvSpPr/>
+              <p:nvPr/>
+            </p:nvSpPr>
+            <p:spPr>
+              <a:xfrm>
+                <a:off x="3067920" y="2478240"/>
+                <a:ext cx="2490840" cy="432360"/>
+              </a:xfrm>
+              <a:prstGeom prst="rect">
+                <a:avLst/>
+              </a:prstGeom>
+              <a:solidFill>
+                <a:srgbClr val="ffffff"/>
+              </a:solidFill>
+              <a:ln w="9525">
+                <a:solidFill>
+                  <a:srgbClr val="000000"/>
+                </a:solidFill>
+                <a:miter/>
+              </a:ln>
+            </p:spPr>
+            <p:style>
+              <a:lnRef idx="0"/>
+              <a:fillRef idx="0"/>
+              <a:effectRef idx="0"/>
+              <a:fontRef idx="minor"/>
+            </p:style>
+            <p:txBody>
+              <a:bodyPr lIns="90000" rIns="90000" tIns="45000" bIns="45000">
+                <a:noAutofit/>
+              </a:bodyPr>
+              <a:p>
+                <a:pPr algn="ctr">
+                  <a:lnSpc>
+                    <a:spcPct val="100000"/>
+                  </a:lnSpc>
+                  <a:spcAft>
+                    <a:spcPts val="799"/>
+                  </a:spcAft>
+                </a:pPr>
+                <a:r>
+                  <a:rPr b="0" lang="en-US" sz="1000" spc="-1" strike="noStrike">
+                    <a:solidFill>
+                      <a:srgbClr val="000000"/>
+                    </a:solidFill>
+                    <a:latin typeface="Arial"/>
+                    <a:ea typeface="Calibri"/>
+                  </a:rPr>
+                  <a:t>Ful</a:t>
+                </a:r>
+                <a:r>
+                  <a:rPr b="0" lang="en-US" sz="1000" spc="-1" strike="noStrike">
+                    <a:solidFill>
+                      <a:srgbClr val="000000"/>
+                    </a:solidFill>
+                    <a:latin typeface="Arial"/>
+                    <a:ea typeface="Calibri"/>
+                  </a:rPr>
+                  <a:t>l-</a:t>
+                </a:r>
+                <a:r>
+                  <a:rPr b="0" lang="en-US" sz="1000" spc="-1" strike="noStrike">
+                    <a:solidFill>
+                      <a:srgbClr val="000000"/>
+                    </a:solidFill>
+                    <a:latin typeface="Arial"/>
+                    <a:ea typeface="Calibri"/>
+                  </a:rPr>
+                  <a:t>tex</a:t>
+                </a:r>
+                <a:r>
+                  <a:rPr b="0" lang="en-US" sz="1000" spc="-1" strike="noStrike">
+                    <a:solidFill>
+                      <a:srgbClr val="000000"/>
+                    </a:solidFill>
+                    <a:latin typeface="Arial"/>
+                    <a:ea typeface="Calibri"/>
+                  </a:rPr>
+                  <a:t>t </a:t>
+                </a:r>
+                <a:r>
+                  <a:rPr b="0" lang="en-US" sz="1000" spc="-1" strike="noStrike">
+                    <a:solidFill>
+                      <a:srgbClr val="000000"/>
+                    </a:solidFill>
+                    <a:latin typeface="Arial"/>
+                    <a:ea typeface="Calibri"/>
+                  </a:rPr>
+                  <a:t>arti</a:t>
+                </a:r>
+                <a:r>
+                  <a:rPr b="0" lang="en-US" sz="1000" spc="-1" strike="noStrike">
+                    <a:solidFill>
+                      <a:srgbClr val="000000"/>
+                    </a:solidFill>
+                    <a:latin typeface="Arial"/>
+                    <a:ea typeface="Calibri"/>
+                  </a:rPr>
+                  <a:t>cle</a:t>
+                </a:r>
+                <a:r>
+                  <a:rPr b="0" lang="en-US" sz="1000" spc="-1" strike="noStrike">
+                    <a:solidFill>
+                      <a:srgbClr val="000000"/>
+                    </a:solidFill>
+                    <a:latin typeface="Arial"/>
+                    <a:ea typeface="Calibri"/>
+                  </a:rPr>
+                  <a:t>s </a:t>
+                </a:r>
+                <a:r>
+                  <a:rPr b="0" lang="en-US" sz="1000" spc="-1" strike="noStrike">
+                    <a:solidFill>
+                      <a:srgbClr val="000000"/>
+                    </a:solidFill>
+                    <a:latin typeface="Arial"/>
+                    <a:ea typeface="Calibri"/>
+                  </a:rPr>
+                  <a:t>as</a:t>
+                </a:r>
+                <a:r>
+                  <a:rPr b="0" lang="en-US" sz="1000" spc="-1" strike="noStrike">
+                    <a:solidFill>
+                      <a:srgbClr val="000000"/>
+                    </a:solidFill>
+                    <a:latin typeface="Arial"/>
+                    <a:ea typeface="Calibri"/>
+                  </a:rPr>
+                  <a:t>se</a:t>
+                </a:r>
+                <a:r>
+                  <a:rPr b="0" lang="en-US" sz="1000" spc="-1" strike="noStrike">
+                    <a:solidFill>
+                      <a:srgbClr val="000000"/>
+                    </a:solidFill>
+                    <a:latin typeface="Arial"/>
+                    <a:ea typeface="Calibri"/>
+                  </a:rPr>
+                  <a:t>ss</a:t>
+                </a:r>
+                <a:r>
+                  <a:rPr b="0" lang="en-US" sz="1000" spc="-1" strike="noStrike">
+                    <a:solidFill>
+                      <a:srgbClr val="000000"/>
+                    </a:solidFill>
+                    <a:latin typeface="Arial"/>
+                    <a:ea typeface="Calibri"/>
+                  </a:rPr>
+                  <a:t>ed </a:t>
+                </a:r>
+                <a:r>
+                  <a:rPr b="0" lang="en-US" sz="1000" spc="-1" strike="noStrike">
+                    <a:solidFill>
+                      <a:srgbClr val="000000"/>
+                    </a:solidFill>
+                    <a:latin typeface="Arial"/>
+                    <a:ea typeface="Calibri"/>
+                  </a:rPr>
+                  <a:t>for </a:t>
+                </a:r>
+                <a:r>
+                  <a:rPr b="0" lang="en-US" sz="1000" spc="-1" strike="noStrike">
+                    <a:solidFill>
+                      <a:srgbClr val="000000"/>
+                    </a:solidFill>
+                    <a:latin typeface="Arial"/>
+                    <a:ea typeface="Calibri"/>
+                  </a:rPr>
+                  <a:t>eli</a:t>
+                </a:r>
+                <a:r>
+                  <a:rPr b="0" lang="en-US" sz="1000" spc="-1" strike="noStrike">
+                    <a:solidFill>
+                      <a:srgbClr val="000000"/>
+                    </a:solidFill>
+                    <a:latin typeface="Arial"/>
+                    <a:ea typeface="Calibri"/>
+                  </a:rPr>
+                  <a:t>gib</a:t>
+                </a:r>
+                <a:r>
+                  <a:rPr b="0" lang="en-US" sz="1000" spc="-1" strike="noStrike">
+                    <a:solidFill>
+                      <a:srgbClr val="000000"/>
+                    </a:solidFill>
+                    <a:latin typeface="Arial"/>
+                    <a:ea typeface="Calibri"/>
+                  </a:rPr>
+                  <a:t>ilit</a:t>
+                </a:r>
+                <a:r>
+                  <a:rPr b="0" lang="en-US" sz="1000" spc="-1" strike="noStrike">
+                    <a:solidFill>
+                      <a:srgbClr val="000000"/>
+                    </a:solidFill>
+                    <a:latin typeface="Arial"/>
+                    <a:ea typeface="Calibri"/>
+                  </a:rPr>
+                  <a:t>y  </a:t>
+                </a:r>
+                <a:r>
+                  <a:rPr b="0" lang="en-US" sz="1000" spc="-1" strike="noStrike">
+                    <a:solidFill>
+                      <a:srgbClr val="000000"/>
+                    </a:solidFill>
+                    <a:latin typeface="Arial"/>
+                    <a:ea typeface="Calibri"/>
+                  </a:rPr>
+                  <a:t>(</a:t>
+                </a:r>
+                <a:r>
+                  <a:rPr b="0" i="1" lang="en-US" sz="1000" spc="-1" strike="noStrike">
+                    <a:solidFill>
+                      <a:srgbClr val="000000"/>
+                    </a:solidFill>
+                    <a:latin typeface="Arial"/>
+                    <a:ea typeface="Calibri"/>
+                  </a:rPr>
+                  <a:t>k</a:t>
+                </a:r>
+                <a:r>
+                  <a:rPr b="0" lang="en-US" sz="1000" spc="-1" strike="noStrike">
+                    <a:solidFill>
+                      <a:srgbClr val="000000"/>
+                    </a:solidFill>
+                    <a:latin typeface="Arial"/>
+                    <a:ea typeface="Calibri"/>
+                  </a:rPr>
+                  <a:t> </a:t>
+                </a:r>
+                <a:r>
+                  <a:rPr b="0" lang="en-US" sz="1000" spc="-1" strike="noStrike">
+                    <a:solidFill>
+                      <a:srgbClr val="000000"/>
+                    </a:solidFill>
+                    <a:latin typeface="Arial"/>
+                    <a:ea typeface="Calibri"/>
+                  </a:rPr>
+                  <a:t>= </a:t>
+                </a:r>
+                <a:r>
+                  <a:rPr b="0" lang="en-US" sz="1000" spc="-1" strike="noStrike">
+                    <a:solidFill>
+                      <a:srgbClr val="000000"/>
+                    </a:solidFill>
+                    <a:latin typeface="Arial"/>
+                    <a:ea typeface="Calibri"/>
+                  </a:rPr>
+                  <a:t>41</a:t>
+                </a:r>
+                <a:r>
+                  <a:rPr b="0" lang="en-US" sz="1000" spc="-1" strike="noStrike">
+                    <a:solidFill>
+                      <a:srgbClr val="000000"/>
+                    </a:solidFill>
+                    <a:latin typeface="Arial"/>
+                    <a:ea typeface="Calibri"/>
+                  </a:rPr>
+                  <a:t>2)</a:t>
+                </a:r>
+                <a:endParaRPr b="0" lang="en-GB" sz="1000" spc="-1" strike="noStrike">
+                  <a:latin typeface="Arial"/>
+                </a:endParaRPr>
+              </a:p>
+            </p:txBody>
+          </p:sp>
+          <p:sp>
+            <p:nvSpPr>
+              <p:cNvPr id="45" name="CustomShape 5"/>
+              <p:cNvSpPr/>
+              <p:nvPr/>
+            </p:nvSpPr>
+            <p:spPr>
+              <a:xfrm>
+                <a:off x="6220080" y="1503000"/>
+                <a:ext cx="2894400" cy="670320"/>
+              </a:xfrm>
+              <a:prstGeom prst="rect">
+                <a:avLst/>
+              </a:prstGeom>
+              <a:solidFill>
+                <a:srgbClr val="ffffff"/>
+              </a:solidFill>
+              <a:ln w="9525">
+                <a:solidFill>
+                  <a:srgbClr val="000000"/>
+                </a:solidFill>
+                <a:miter/>
+              </a:ln>
+            </p:spPr>
+            <p:style>
+              <a:lnRef idx="0"/>
+              <a:fillRef idx="0"/>
+              <a:effectRef idx="0"/>
+              <a:fontRef idx="minor"/>
+            </p:style>
+            <p:txBody>
+              <a:bodyPr lIns="90000" rIns="90000" tIns="45000" bIns="45000">
+                <a:noAutofit/>
+              </a:bodyPr>
+              <a:p>
+                <a:pPr>
+                  <a:lnSpc>
+                    <a:spcPct val="100000"/>
+                  </a:lnSpc>
+                  <a:spcAft>
+                    <a:spcPts val="799"/>
+                  </a:spcAft>
+                </a:pPr>
+                <a:r>
+                  <a:rPr b="0" lang="en-US" sz="1000" spc="-1" strike="noStrike">
+                    <a:solidFill>
+                      <a:srgbClr val="000000"/>
+                    </a:solidFill>
+                    <a:latin typeface="Arial"/>
+                    <a:ea typeface="Calibri"/>
+                  </a:rPr>
+                  <a:t>Re</a:t>
+                </a:r>
+                <a:r>
+                  <a:rPr b="0" lang="en-US" sz="1000" spc="-1" strike="noStrike">
+                    <a:solidFill>
+                      <a:srgbClr val="000000"/>
+                    </a:solidFill>
+                    <a:latin typeface="Arial"/>
+                    <a:ea typeface="Calibri"/>
+                  </a:rPr>
+                  <a:t>cor</a:t>
+                </a:r>
+                <a:r>
+                  <a:rPr b="0" lang="en-US" sz="1000" spc="-1" strike="noStrike">
+                    <a:solidFill>
+                      <a:srgbClr val="000000"/>
+                    </a:solidFill>
+                    <a:latin typeface="Arial"/>
+                    <a:ea typeface="Calibri"/>
+                  </a:rPr>
+                  <a:t>ds </a:t>
+                </a:r>
+                <a:r>
+                  <a:rPr b="0" lang="en-US" sz="1000" spc="-1" strike="noStrike">
+                    <a:solidFill>
+                      <a:srgbClr val="000000"/>
+                    </a:solidFill>
+                    <a:latin typeface="Arial"/>
+                    <a:ea typeface="Calibri"/>
+                  </a:rPr>
+                  <a:t>ex</a:t>
+                </a:r>
+                <a:r>
+                  <a:rPr b="0" lang="en-US" sz="1000" spc="-1" strike="noStrike">
+                    <a:solidFill>
+                      <a:srgbClr val="000000"/>
+                    </a:solidFill>
+                    <a:latin typeface="Arial"/>
+                    <a:ea typeface="Calibri"/>
+                  </a:rPr>
+                  <a:t>clu</a:t>
+                </a:r>
+                <a:r>
+                  <a:rPr b="0" lang="en-US" sz="1000" spc="-1" strike="noStrike">
+                    <a:solidFill>
+                      <a:srgbClr val="000000"/>
+                    </a:solidFill>
+                    <a:latin typeface="Arial"/>
+                    <a:ea typeface="Calibri"/>
+                  </a:rPr>
+                  <a:t>de</a:t>
+                </a:r>
+                <a:r>
+                  <a:rPr b="0" lang="en-US" sz="1000" spc="-1" strike="noStrike">
+                    <a:solidFill>
+                      <a:srgbClr val="000000"/>
+                    </a:solidFill>
+                    <a:latin typeface="Arial"/>
+                    <a:ea typeface="Calibri"/>
+                  </a:rPr>
+                  <a:t>d: </a:t>
+                </a:r>
+                <a:endParaRPr b="0" lang="en-GB" sz="1000" spc="-1" strike="noStrike">
+                  <a:latin typeface="Arial"/>
+                </a:endParaRPr>
+              </a:p>
+              <a:p>
+                <a:pPr>
+                  <a:lnSpc>
+                    <a:spcPct val="100000"/>
+                  </a:lnSpc>
+                  <a:spcAft>
+                    <a:spcPts val="799"/>
+                  </a:spcAft>
+                </a:pPr>
+                <a:r>
+                  <a:rPr b="0" lang="en-US" sz="1000" spc="-1" strike="noStrike">
+                    <a:solidFill>
+                      <a:srgbClr val="000000"/>
+                    </a:solidFill>
+                    <a:latin typeface="Arial"/>
+                    <a:ea typeface="Calibri"/>
+                  </a:rPr>
+                  <a:t>No</a:t>
+                </a:r>
+                <a:r>
+                  <a:rPr b="0" lang="en-US" sz="1000" spc="-1" strike="noStrike">
+                    <a:solidFill>
+                      <a:srgbClr val="000000"/>
+                    </a:solidFill>
+                    <a:latin typeface="Arial"/>
+                    <a:ea typeface="Calibri"/>
+                  </a:rPr>
+                  <a:t>t </a:t>
+                </a:r>
+                <a:r>
+                  <a:rPr b="0" lang="en-US" sz="1000" spc="-1" strike="noStrike">
+                    <a:solidFill>
+                      <a:srgbClr val="000000"/>
+                    </a:solidFill>
+                    <a:latin typeface="Arial"/>
+                    <a:ea typeface="Calibri"/>
+                  </a:rPr>
+                  <a:t>stu</a:t>
+                </a:r>
+                <a:r>
+                  <a:rPr b="0" lang="en-US" sz="1000" spc="-1" strike="noStrike">
+                    <a:solidFill>
+                      <a:srgbClr val="000000"/>
+                    </a:solidFill>
+                    <a:latin typeface="Arial"/>
+                    <a:ea typeface="Calibri"/>
+                  </a:rPr>
+                  <a:t>die</a:t>
+                </a:r>
+                <a:r>
+                  <a:rPr b="0" lang="en-US" sz="1000" spc="-1" strike="noStrike">
+                    <a:solidFill>
+                      <a:srgbClr val="000000"/>
+                    </a:solidFill>
+                    <a:latin typeface="Arial"/>
+                    <a:ea typeface="Calibri"/>
+                  </a:rPr>
+                  <a:t>s </a:t>
+                </a:r>
+                <a:r>
+                  <a:rPr b="0" lang="en-US" sz="1000" spc="-1" strike="noStrike">
+                    <a:solidFill>
+                      <a:srgbClr val="000000"/>
+                    </a:solidFill>
+                    <a:latin typeface="Arial"/>
+                    <a:ea typeface="Calibri"/>
+                  </a:rPr>
+                  <a:t>on </a:t>
+                </a:r>
+                <a:r>
+                  <a:rPr b="0" lang="en-US" sz="1000" spc="-1" strike="noStrike">
+                    <a:solidFill>
+                      <a:srgbClr val="000000"/>
+                    </a:solidFill>
+                    <a:latin typeface="Arial"/>
+                    <a:ea typeface="Calibri"/>
+                  </a:rPr>
+                  <a:t>de</a:t>
+                </a:r>
+                <a:r>
+                  <a:rPr b="0" lang="en-US" sz="1000" spc="-1" strike="noStrike">
+                    <a:solidFill>
+                      <a:srgbClr val="000000"/>
+                    </a:solidFill>
+                    <a:latin typeface="Arial"/>
+                    <a:ea typeface="Calibri"/>
+                  </a:rPr>
+                  <a:t>cis</a:t>
+                </a:r>
+                <a:r>
+                  <a:rPr b="0" lang="en-US" sz="1000" spc="-1" strike="noStrike">
+                    <a:solidFill>
+                      <a:srgbClr val="000000"/>
+                    </a:solidFill>
+                    <a:latin typeface="Arial"/>
+                    <a:ea typeface="Calibri"/>
+                  </a:rPr>
+                  <a:t>ion </a:t>
+                </a:r>
+                <a:r>
+                  <a:rPr b="0" lang="en-US" sz="1000" spc="-1" strike="noStrike">
+                    <a:solidFill>
+                      <a:srgbClr val="000000"/>
+                    </a:solidFill>
+                    <a:latin typeface="Arial"/>
+                    <a:ea typeface="Calibri"/>
+                  </a:rPr>
+                  <a:t>ma</a:t>
+                </a:r>
+                <a:r>
+                  <a:rPr b="0" lang="en-US" sz="1000" spc="-1" strike="noStrike">
+                    <a:solidFill>
+                      <a:srgbClr val="000000"/>
+                    </a:solidFill>
+                    <a:latin typeface="Arial"/>
+                    <a:ea typeface="Calibri"/>
+                  </a:rPr>
+                  <a:t>kin</a:t>
+                </a:r>
+                <a:r>
+                  <a:rPr b="0" lang="en-US" sz="1000" spc="-1" strike="noStrike">
+                    <a:solidFill>
+                      <a:srgbClr val="000000"/>
+                    </a:solidFill>
+                    <a:latin typeface="Arial"/>
+                    <a:ea typeface="Calibri"/>
+                  </a:rPr>
+                  <a:t>g </a:t>
+                </a:r>
+                <a:r>
+                  <a:rPr b="0" lang="en-US" sz="1000" spc="-1" strike="noStrike">
+                    <a:solidFill>
+                      <a:srgbClr val="000000"/>
+                    </a:solidFill>
+                    <a:latin typeface="Arial"/>
+                    <a:ea typeface="Calibri"/>
+                  </a:rPr>
+                  <a:t>or </a:t>
+                </a:r>
+                <a:r>
+                  <a:rPr b="0" lang="en-US" sz="1000" spc="-1" strike="noStrike">
+                    <a:solidFill>
+                      <a:srgbClr val="000000"/>
+                    </a:solidFill>
+                    <a:latin typeface="Arial"/>
+                    <a:ea typeface="Calibri"/>
+                  </a:rPr>
+                  <a:t>no </a:t>
+                </a:r>
+                <a:r>
+                  <a:rPr b="0" lang="en-US" sz="1000" spc="-1" strike="noStrike">
+                    <a:solidFill>
+                      <a:srgbClr val="000000"/>
+                    </a:solidFill>
+                    <a:latin typeface="Arial"/>
+                    <a:ea typeface="Calibri"/>
+                  </a:rPr>
+                  <a:t>ey</a:t>
+                </a:r>
+                <a:r>
+                  <a:rPr b="0" lang="en-US" sz="1000" spc="-1" strike="noStrike">
+                    <a:solidFill>
+                      <a:srgbClr val="000000"/>
+                    </a:solidFill>
+                    <a:latin typeface="Arial"/>
+                    <a:ea typeface="Calibri"/>
+                  </a:rPr>
+                  <a:t>e-</a:t>
+                </a:r>
+                <a:r>
+                  <a:rPr b="0" lang="en-US" sz="1000" spc="-1" strike="noStrike">
+                    <a:solidFill>
+                      <a:srgbClr val="000000"/>
+                    </a:solidFill>
+                    <a:latin typeface="Arial"/>
+                    <a:ea typeface="Calibri"/>
+                  </a:rPr>
+                  <a:t>tra</a:t>
+                </a:r>
+                <a:r>
+                  <a:rPr b="0" lang="en-US" sz="1000" spc="-1" strike="noStrike">
+                    <a:solidFill>
+                      <a:srgbClr val="000000"/>
+                    </a:solidFill>
+                    <a:latin typeface="Arial"/>
+                    <a:ea typeface="Calibri"/>
+                  </a:rPr>
+                  <a:t>cki</a:t>
+                </a:r>
+                <a:r>
+                  <a:rPr b="0" lang="en-US" sz="1000" spc="-1" strike="noStrike">
+                    <a:solidFill>
+                      <a:srgbClr val="000000"/>
+                    </a:solidFill>
+                    <a:latin typeface="Arial"/>
+                    <a:ea typeface="Calibri"/>
+                  </a:rPr>
+                  <a:t>ng </a:t>
+                </a:r>
+                <a:r>
+                  <a:rPr b="0" lang="en-US" sz="1000" spc="-1" strike="noStrike">
+                    <a:solidFill>
+                      <a:srgbClr val="000000"/>
+                    </a:solidFill>
+                    <a:latin typeface="Arial"/>
+                    <a:ea typeface="Calibri"/>
+                  </a:rPr>
+                  <a:t>(</a:t>
+                </a:r>
+                <a:r>
+                  <a:rPr b="0" i="1" lang="en-US" sz="1000" spc="-1" strike="noStrike">
+                    <a:solidFill>
+                      <a:srgbClr val="000000"/>
+                    </a:solidFill>
+                    <a:latin typeface="Arial"/>
+                    <a:ea typeface="Calibri"/>
+                  </a:rPr>
+                  <a:t>k</a:t>
+                </a:r>
+                <a:r>
+                  <a:rPr b="0" lang="en-US" sz="1000" spc="-1" strike="noStrike">
+                    <a:solidFill>
+                      <a:srgbClr val="000000"/>
+                    </a:solidFill>
+                    <a:latin typeface="Arial"/>
+                    <a:ea typeface="Calibri"/>
+                  </a:rPr>
+                  <a:t> </a:t>
+                </a:r>
+                <a:r>
+                  <a:rPr b="0" lang="en-US" sz="1000" spc="-1" strike="noStrike">
+                    <a:solidFill>
+                      <a:srgbClr val="000000"/>
+                    </a:solidFill>
+                    <a:latin typeface="Arial"/>
+                    <a:ea typeface="Calibri"/>
+                  </a:rPr>
+                  <a:t>= </a:t>
+                </a:r>
+                <a:r>
+                  <a:rPr b="0" lang="en-US" sz="1000" spc="-1" strike="noStrike">
+                    <a:solidFill>
+                      <a:srgbClr val="000000"/>
+                    </a:solidFill>
+                    <a:latin typeface="Arial"/>
+                    <a:ea typeface="Calibri"/>
+                  </a:rPr>
+                  <a:t>17</a:t>
+                </a:r>
+                <a:r>
+                  <a:rPr b="0" lang="en-US" sz="1000" spc="-1" strike="noStrike">
+                    <a:solidFill>
+                      <a:srgbClr val="000000"/>
+                    </a:solidFill>
+                    <a:latin typeface="Arial"/>
+                    <a:ea typeface="Calibri"/>
+                  </a:rPr>
+                  <a:t>9)</a:t>
+                </a:r>
+                <a:endParaRPr b="0" lang="en-GB" sz="1000" spc="-1" strike="noStrike">
+                  <a:latin typeface="Arial"/>
+                </a:endParaRPr>
+              </a:p>
+              <a:p>
+                <a:pPr algn="ctr">
+                  <a:lnSpc>
+                    <a:spcPct val="107000"/>
+                  </a:lnSpc>
+                  <a:spcAft>
+                    <a:spcPts val="799"/>
+                  </a:spcAft>
+                </a:pPr>
+                <a:r>
+                  <a:rPr b="0" lang="en-US" sz="1000" spc="-1" strike="noStrike">
+                    <a:solidFill>
+                      <a:srgbClr val="000000"/>
+                    </a:solidFill>
+                    <a:latin typeface="Arial"/>
+                    <a:ea typeface="Calibri"/>
+                  </a:rPr>
+                  <a:t> </a:t>
+                </a:r>
+                <a:endParaRPr b="0" lang="en-GB" sz="1000" spc="-1" strike="noStrike">
+                  <a:latin typeface="Arial"/>
+                </a:endParaRPr>
+              </a:p>
+            </p:txBody>
+          </p:sp>
+          <p:sp>
+            <p:nvSpPr>
+              <p:cNvPr id="46" name="CustomShape 6"/>
+              <p:cNvSpPr/>
+              <p:nvPr/>
+            </p:nvSpPr>
+            <p:spPr>
+              <a:xfrm>
+                <a:off x="3069000" y="3489480"/>
+                <a:ext cx="2491200" cy="432720"/>
+              </a:xfrm>
+              <a:prstGeom prst="rect">
+                <a:avLst/>
+              </a:prstGeom>
+              <a:solidFill>
+                <a:srgbClr val="ffffff"/>
+              </a:solidFill>
+              <a:ln w="9525">
+                <a:solidFill>
+                  <a:srgbClr val="000000"/>
+                </a:solidFill>
+                <a:miter/>
+              </a:ln>
+            </p:spPr>
+            <p:style>
+              <a:lnRef idx="0"/>
+              <a:fillRef idx="0"/>
+              <a:effectRef idx="0"/>
+              <a:fontRef idx="minor"/>
+            </p:style>
+            <p:txBody>
+              <a:bodyPr lIns="90000" rIns="90000" tIns="45000" bIns="45000">
+                <a:noAutofit/>
+              </a:bodyPr>
+              <a:p>
+                <a:pPr algn="ctr">
+                  <a:lnSpc>
+                    <a:spcPct val="100000"/>
+                  </a:lnSpc>
+                  <a:spcAft>
+                    <a:spcPts val="799"/>
+                  </a:spcAft>
+                </a:pPr>
+                <a:r>
+                  <a:rPr b="0" lang="en-US" sz="1000" spc="-1" strike="noStrike">
+                    <a:solidFill>
+                      <a:srgbClr val="000000"/>
+                    </a:solidFill>
+                    <a:latin typeface="Arial"/>
+                    <a:ea typeface="Calibri"/>
+                  </a:rPr>
+                  <a:t>Art</a:t>
+                </a:r>
+                <a:r>
+                  <a:rPr b="0" lang="en-US" sz="1000" spc="-1" strike="noStrike">
+                    <a:solidFill>
+                      <a:srgbClr val="000000"/>
+                    </a:solidFill>
+                    <a:latin typeface="Arial"/>
+                    <a:ea typeface="Calibri"/>
+                  </a:rPr>
+                  <a:t>icl</a:t>
+                </a:r>
+                <a:r>
+                  <a:rPr b="0" lang="en-US" sz="1000" spc="-1" strike="noStrike">
+                    <a:solidFill>
+                      <a:srgbClr val="000000"/>
+                    </a:solidFill>
+                    <a:latin typeface="Arial"/>
+                    <a:ea typeface="Calibri"/>
+                  </a:rPr>
+                  <a:t>es </a:t>
+                </a:r>
+                <a:r>
+                  <a:rPr b="0" lang="en-US" sz="1000" spc="-1" strike="noStrike">
+                    <a:solidFill>
+                      <a:srgbClr val="000000"/>
+                    </a:solidFill>
+                    <a:latin typeface="Arial"/>
+                    <a:ea typeface="Calibri"/>
+                  </a:rPr>
+                  <a:t>co</a:t>
+                </a:r>
+                <a:r>
+                  <a:rPr b="0" lang="en-US" sz="1000" spc="-1" strike="noStrike">
+                    <a:solidFill>
+                      <a:srgbClr val="000000"/>
+                    </a:solidFill>
+                    <a:latin typeface="Arial"/>
+                    <a:ea typeface="Calibri"/>
+                  </a:rPr>
+                  <a:t>nfo</a:t>
+                </a:r>
+                <a:r>
+                  <a:rPr b="0" lang="en-US" sz="1000" spc="-1" strike="noStrike">
+                    <a:solidFill>
+                      <a:srgbClr val="000000"/>
+                    </a:solidFill>
+                    <a:latin typeface="Arial"/>
+                    <a:ea typeface="Calibri"/>
+                  </a:rPr>
+                  <a:t>rmi</a:t>
+                </a:r>
+                <a:r>
+                  <a:rPr b="0" lang="en-US" sz="1000" spc="-1" strike="noStrike">
+                    <a:solidFill>
+                      <a:srgbClr val="000000"/>
+                    </a:solidFill>
+                    <a:latin typeface="Arial"/>
+                    <a:ea typeface="Calibri"/>
+                  </a:rPr>
+                  <a:t>ng </a:t>
+                </a:r>
+                <a:r>
+                  <a:rPr b="0" lang="en-US" sz="1000" spc="-1" strike="noStrike">
+                    <a:solidFill>
+                      <a:srgbClr val="000000"/>
+                    </a:solidFill>
+                    <a:latin typeface="Arial"/>
+                    <a:ea typeface="Calibri"/>
+                  </a:rPr>
+                  <a:t>to </a:t>
+                </a:r>
+                <a:r>
+                  <a:rPr b="0" lang="en-US" sz="1000" spc="-1" strike="noStrike">
+                    <a:solidFill>
+                      <a:srgbClr val="000000"/>
+                    </a:solidFill>
+                    <a:latin typeface="Arial"/>
+                    <a:ea typeface="Calibri"/>
+                  </a:rPr>
+                  <a:t>all </a:t>
+                </a:r>
+                <a:r>
+                  <a:rPr b="0" lang="en-US" sz="1000" spc="-1" strike="noStrike">
+                    <a:solidFill>
+                      <a:srgbClr val="000000"/>
+                    </a:solidFill>
+                    <a:latin typeface="Arial"/>
+                    <a:ea typeface="Calibri"/>
+                  </a:rPr>
+                  <a:t>inc</a:t>
+                </a:r>
+                <a:r>
+                  <a:rPr b="0" lang="en-US" sz="1000" spc="-1" strike="noStrike">
+                    <a:solidFill>
+                      <a:srgbClr val="000000"/>
+                    </a:solidFill>
+                    <a:latin typeface="Arial"/>
+                    <a:ea typeface="Calibri"/>
+                  </a:rPr>
+                  <a:t>lus</a:t>
+                </a:r>
+                <a:r>
+                  <a:rPr b="0" lang="en-US" sz="1000" spc="-1" strike="noStrike">
+                    <a:solidFill>
+                      <a:srgbClr val="000000"/>
+                    </a:solidFill>
+                    <a:latin typeface="Arial"/>
+                    <a:ea typeface="Calibri"/>
+                  </a:rPr>
+                  <a:t>ion </a:t>
+                </a:r>
+                <a:r>
+                  <a:rPr b="0" lang="en-US" sz="1000" spc="-1" strike="noStrike">
+                    <a:solidFill>
+                      <a:srgbClr val="000000"/>
+                    </a:solidFill>
+                    <a:latin typeface="Arial"/>
+                    <a:ea typeface="Calibri"/>
+                  </a:rPr>
+                  <a:t>crit</a:t>
+                </a:r>
+                <a:r>
+                  <a:rPr b="0" lang="en-US" sz="1000" spc="-1" strike="noStrike">
+                    <a:solidFill>
+                      <a:srgbClr val="000000"/>
+                    </a:solidFill>
+                    <a:latin typeface="Arial"/>
+                    <a:ea typeface="Calibri"/>
+                  </a:rPr>
+                  <a:t>eri</a:t>
+                </a:r>
+                <a:r>
+                  <a:rPr b="0" lang="en-US" sz="1000" spc="-1" strike="noStrike">
+                    <a:solidFill>
+                      <a:srgbClr val="000000"/>
+                    </a:solidFill>
+                    <a:latin typeface="Arial"/>
+                    <a:ea typeface="Calibri"/>
+                  </a:rPr>
+                  <a:t>a </a:t>
+                </a:r>
+                <a:r>
+                  <a:rPr b="0" lang="en-US" sz="1000" spc="-1" strike="noStrike">
+                    <a:solidFill>
+                      <a:srgbClr val="000000"/>
+                    </a:solidFill>
+                    <a:latin typeface="Arial"/>
+                    <a:ea typeface="Calibri"/>
+                  </a:rPr>
+                  <a:t>(</a:t>
+                </a:r>
+                <a:r>
+                  <a:rPr b="0" i="1" lang="en-US" sz="1000" spc="-1" strike="noStrike">
+                    <a:solidFill>
+                      <a:srgbClr val="000000"/>
+                    </a:solidFill>
+                    <a:latin typeface="Arial"/>
+                    <a:ea typeface="Calibri"/>
+                  </a:rPr>
+                  <a:t>k</a:t>
+                </a:r>
+                <a:r>
+                  <a:rPr b="0" lang="en-US" sz="1000" spc="-1" strike="noStrike">
+                    <a:solidFill>
+                      <a:srgbClr val="000000"/>
+                    </a:solidFill>
+                    <a:latin typeface="Arial"/>
+                    <a:ea typeface="Calibri"/>
+                  </a:rPr>
+                  <a:t> </a:t>
+                </a:r>
+                <a:r>
+                  <a:rPr b="0" lang="en-US" sz="1000" spc="-1" strike="noStrike">
+                    <a:solidFill>
+                      <a:srgbClr val="000000"/>
+                    </a:solidFill>
+                    <a:latin typeface="Arial"/>
+                    <a:ea typeface="Calibri"/>
+                  </a:rPr>
+                  <a:t>= </a:t>
+                </a:r>
+                <a:r>
+                  <a:rPr b="0" lang="en-US" sz="1000" spc="-1" strike="noStrike">
+                    <a:solidFill>
+                      <a:srgbClr val="000000"/>
+                    </a:solidFill>
+                    <a:latin typeface="Arial"/>
+                    <a:ea typeface="Calibri"/>
+                  </a:rPr>
+                  <a:t>69)</a:t>
+                </a:r>
+                <a:endParaRPr b="0" lang="en-GB" sz="1000" spc="-1" strike="noStrike">
+                  <a:latin typeface="Arial"/>
+                </a:endParaRPr>
+              </a:p>
+            </p:txBody>
+          </p:sp>
+          <p:sp>
+            <p:nvSpPr>
+              <p:cNvPr id="47" name="CustomShape 8"/>
+              <p:cNvSpPr/>
+              <p:nvPr/>
+            </p:nvSpPr>
+            <p:spPr>
+              <a:xfrm>
+                <a:off x="4314240" y="1273320"/>
+                <a:ext cx="720" cy="224280"/>
+              </a:xfrm>
+              <a:custGeom>
+                <a:avLst/>
+                <a:gdLst/>
+                <a:ahLst/>
+                <a:rect l="l" t="t" r="r" b="b"/>
+                <a:pathLst>
+                  <a:path w="21600" h="21600">
+                    <a:moveTo>
+                      <a:pt x="0" y="0"/>
+                    </a:moveTo>
+                    <a:lnTo>
+                      <a:pt x="21600" y="21600"/>
+                    </a:lnTo>
+                  </a:path>
+                </a:pathLst>
+              </a:custGeom>
+              <a:noFill/>
+              <a:ln w="9525">
+                <a:solidFill>
+                  <a:srgbClr val="000000"/>
+                </a:solidFill>
+                <a:miter/>
+                <a:tailEnd len="med" type="triangle" w="med"/>
+              </a:ln>
+            </p:spPr>
+            <p:style>
+              <a:lnRef idx="0"/>
+              <a:fillRef idx="0"/>
+              <a:effectRef idx="0"/>
+              <a:fontRef idx="minor"/>
+            </p:style>
+          </p:sp>
+          <p:sp>
+            <p:nvSpPr>
+              <p:cNvPr id="48" name="CustomShape 9"/>
+              <p:cNvSpPr/>
+              <p:nvPr/>
+            </p:nvSpPr>
+            <p:spPr>
+              <a:xfrm flipH="1">
+                <a:off x="4312080" y="1932480"/>
+                <a:ext cx="1080" cy="545040"/>
+              </a:xfrm>
+              <a:custGeom>
+                <a:avLst/>
+                <a:gdLst/>
+                <a:ahLst/>
+                <a:rect l="l" t="t" r="r" b="b"/>
+                <a:pathLst>
+                  <a:path w="21600" h="21600">
+                    <a:moveTo>
+                      <a:pt x="0" y="0"/>
+                    </a:moveTo>
+                    <a:lnTo>
+                      <a:pt x="21600" y="21600"/>
+                    </a:lnTo>
+                  </a:path>
+                </a:pathLst>
+              </a:custGeom>
+              <a:noFill/>
+              <a:ln w="9525">
+                <a:solidFill>
+                  <a:srgbClr val="000000"/>
+                </a:solidFill>
+                <a:miter/>
+                <a:tailEnd len="med" type="triangle" w="med"/>
+              </a:ln>
+            </p:spPr>
+            <p:style>
+              <a:lnRef idx="0"/>
+              <a:fillRef idx="0"/>
+              <a:effectRef idx="0"/>
+              <a:fontRef idx="minor"/>
+            </p:style>
+          </p:sp>
+          <p:sp>
+            <p:nvSpPr>
+              <p:cNvPr id="49" name="CustomShape 10"/>
+              <p:cNvSpPr/>
+              <p:nvPr/>
+            </p:nvSpPr>
+            <p:spPr>
+              <a:xfrm>
+                <a:off x="4314960" y="2911680"/>
+                <a:ext cx="360" cy="576360"/>
+              </a:xfrm>
+              <a:custGeom>
+                <a:avLst/>
+                <a:gdLst/>
+                <a:ahLst/>
+                <a:rect l="l" t="t" r="r" b="b"/>
+                <a:pathLst>
+                  <a:path w="21600" h="21600">
+                    <a:moveTo>
+                      <a:pt x="0" y="0"/>
+                    </a:moveTo>
+                    <a:lnTo>
+                      <a:pt x="21600" y="21600"/>
+                    </a:lnTo>
+                  </a:path>
+                </a:pathLst>
+              </a:custGeom>
+              <a:noFill/>
+              <a:ln w="9525">
+                <a:solidFill>
+                  <a:srgbClr val="000000"/>
+                </a:solidFill>
+                <a:miter/>
+                <a:tailEnd len="med" type="triangle" w="med"/>
+              </a:ln>
+            </p:spPr>
+            <p:style>
+              <a:lnRef idx="0"/>
+              <a:fillRef idx="0"/>
+              <a:effectRef idx="0"/>
+              <a:fontRef idx="minor"/>
+            </p:style>
+          </p:sp>
+          <p:sp>
+            <p:nvSpPr>
+              <p:cNvPr id="50" name="CustomShape 11"/>
+              <p:cNvSpPr/>
+              <p:nvPr/>
+            </p:nvSpPr>
+            <p:spPr>
+              <a:xfrm>
+                <a:off x="5561280" y="1715400"/>
+                <a:ext cx="659160" cy="360"/>
+              </a:xfrm>
+              <a:custGeom>
+                <a:avLst/>
+                <a:gdLst/>
+                <a:ahLst/>
+                <a:rect l="l" t="t" r="r" b="b"/>
+                <a:pathLst>
+                  <a:path w="21600" h="21600">
+                    <a:moveTo>
+                      <a:pt x="0" y="0"/>
+                    </a:moveTo>
+                    <a:lnTo>
+                      <a:pt x="21600" y="21600"/>
+                    </a:lnTo>
+                  </a:path>
+                </a:pathLst>
+              </a:custGeom>
+              <a:noFill/>
+              <a:ln w="9525">
+                <a:solidFill>
+                  <a:srgbClr val="000000"/>
+                </a:solidFill>
+                <a:miter/>
+                <a:tailEnd len="med" type="triangle" w="med"/>
+              </a:ln>
+            </p:spPr>
+            <p:style>
+              <a:lnRef idx="0"/>
+              <a:fillRef idx="0"/>
+              <a:effectRef idx="0"/>
+              <a:fontRef idx="minor"/>
+            </p:style>
+          </p:sp>
+          <p:sp>
+            <p:nvSpPr>
+              <p:cNvPr id="51" name="CustomShape 12"/>
+              <p:cNvSpPr/>
+              <p:nvPr/>
+            </p:nvSpPr>
+            <p:spPr>
+              <a:xfrm flipV="1">
+                <a:off x="5560560" y="2691720"/>
+                <a:ext cx="659520" cy="360"/>
+              </a:xfrm>
+              <a:custGeom>
+                <a:avLst/>
+                <a:gdLst/>
+                <a:ahLst/>
+                <a:rect l="l" t="t" r="r" b="b"/>
+                <a:pathLst>
+                  <a:path w="21600" h="21600">
+                    <a:moveTo>
+                      <a:pt x="0" y="0"/>
+                    </a:moveTo>
+                    <a:lnTo>
+                      <a:pt x="21600" y="21600"/>
+                    </a:lnTo>
+                  </a:path>
+                </a:pathLst>
+              </a:custGeom>
+              <a:noFill/>
+              <a:ln w="9525">
+                <a:solidFill>
+                  <a:srgbClr val="000000"/>
+                </a:solidFill>
+                <a:miter/>
+                <a:tailEnd len="med" type="triangle" w="med"/>
+              </a:ln>
+            </p:spPr>
+            <p:style>
+              <a:lnRef idx="0"/>
+              <a:fillRef idx="0"/>
+              <a:effectRef idx="0"/>
+              <a:fontRef idx="minor"/>
+            </p:style>
+          </p:sp>
+          <p:sp>
+            <p:nvSpPr>
+              <p:cNvPr id="52" name="CustomShape 13"/>
+              <p:cNvSpPr/>
+              <p:nvPr/>
+            </p:nvSpPr>
+            <p:spPr>
+              <a:xfrm>
+                <a:off x="5561280" y="973080"/>
+                <a:ext cx="659160" cy="360"/>
+              </a:xfrm>
+              <a:custGeom>
+                <a:avLst/>
+                <a:gdLst/>
+                <a:ahLst/>
+                <a:rect l="l" t="t" r="r" b="b"/>
+                <a:pathLst>
+                  <a:path w="21600" h="21600">
+                    <a:moveTo>
+                      <a:pt x="0" y="0"/>
+                    </a:moveTo>
+                    <a:lnTo>
+                      <a:pt x="21600" y="21600"/>
+                    </a:lnTo>
+                  </a:path>
+                </a:pathLst>
+              </a:custGeom>
+              <a:noFill/>
+              <a:ln w="9525">
+                <a:solidFill>
+                  <a:srgbClr val="000000"/>
+                </a:solidFill>
+                <a:miter/>
+                <a:tailEnd len="med" type="triangle" w="med"/>
+              </a:ln>
+            </p:spPr>
+            <p:style>
+              <a:lnRef idx="0"/>
+              <a:fillRef idx="0"/>
+              <a:effectRef idx="0"/>
+              <a:fontRef idx="minor"/>
+            </p:style>
+          </p:sp>
+        </p:grpSp>
+      </p:grpSp>
     </p:spTree>
   </p:cSld>
   <mc:AlternateContent>

</xml_diff>